<commit_message>
white washing for bulletin board slides
</commit_message>
<xml_diff>
--- a/kubernetes/k8s-bulletinboard/03_k8s-bulletinboard.pptx
+++ b/kubernetes/k8s-bulletinboard/03_k8s-bulletinboard.pptx
@@ -8,10 +8,10 @@
     <p:sldMasterId id="2147483827" r:id="rId4"/>
   </p:sldMasterIdLst>
   <p:notesMasterIdLst>
-    <p:notesMasterId r:id="rId15"/>
+    <p:notesMasterId r:id="rId12"/>
   </p:notesMasterIdLst>
   <p:handoutMasterIdLst>
-    <p:handoutMasterId r:id="rId16"/>
+    <p:handoutMasterId r:id="rId13"/>
   </p:handoutMasterIdLst>
   <p:sldIdLst>
     <p:sldId id="433" r:id="rId5"/>
@@ -20,10 +20,7 @@
     <p:sldId id="927" r:id="rId8"/>
     <p:sldId id="928" r:id="rId9"/>
     <p:sldId id="953" r:id="rId10"/>
-    <p:sldId id="450" r:id="rId11"/>
-    <p:sldId id="452" r:id="rId12"/>
-    <p:sldId id="449" r:id="rId13"/>
-    <p:sldId id="265" r:id="rId14"/>
+    <p:sldId id="265" r:id="rId11"/>
   </p:sldIdLst>
   <p:sldSz cx="12195175" cy="6858000"/>
   <p:notesSz cx="6797675" cy="9928225"/>
@@ -1013,37 +1010,6 @@
       </p:grpSpPr>
       <p:sp>
         <p:nvSpPr>
-          <p:cNvPr id="2" name="Slide Image Placeholder 1"/>
-          <p:cNvSpPr>
-            <a:spLocks noGrp="1" noRot="1" noChangeAspect="1"/>
-          </p:cNvSpPr>
-          <p:nvPr>
-            <p:ph type="sldImg"/>
-          </p:nvPr>
-        </p:nvSpPr>
-        <p:spPr/>
-      </p:sp>
-      <p:sp>
-        <p:nvSpPr>
-          <p:cNvPr id="3" name="Notes Placeholder 2"/>
-          <p:cNvSpPr>
-            <a:spLocks noGrp="1"/>
-          </p:cNvSpPr>
-          <p:nvPr>
-            <p:ph type="body" idx="1"/>
-          </p:nvPr>
-        </p:nvSpPr>
-        <p:spPr/>
-        <p:txBody>
-          <a:bodyPr/>
-          <a:lstStyle/>
-          <a:p>
-            <a:endParaRPr lang="en-US"/>
-          </a:p>
-        </p:txBody>
-      </p:sp>
-      <p:sp>
-        <p:nvSpPr>
           <p:cNvPr id="4" name="Slide Number Placeholder 3"/>
           <p:cNvSpPr>
             <a:spLocks noGrp="1"/>
@@ -1057,307 +1023,10 @@
           <a:bodyPr/>
           <a:lstStyle/>
           <a:p>
-            <a:pPr marL="0" marR="0" lvl="0" indent="0" algn="ctr" defTabSz="1088776" rtl="0" eaLnBrk="1" fontAlgn="auto" latinLnBrk="0" hangingPunct="1">
-              <a:lnSpc>
-                <a:spcPct val="100000"/>
-              </a:lnSpc>
-              <a:spcBef>
-                <a:spcPts val="0"/>
-              </a:spcBef>
-              <a:spcAft>
-                <a:spcPts val="0"/>
-              </a:spcAft>
-              <a:buClrTx/>
-              <a:buSzTx/>
-              <a:buFontTx/>
-              <a:buNone/>
-              <a:tabLst/>
-              <a:defRPr/>
-            </a:pPr>
-            <a:fld id="{7D8C2C35-2B8A-446E-BEC0-FD36716C29AC}" type="slidenum">
-              <a:rPr kumimoji="0" lang="de-DE" sz="800" b="0" i="0" u="none" strike="noStrike" kern="1200" cap="none" spc="0" normalizeH="0" baseline="0" noProof="0" smtClean="0">
-                <a:ln>
-                  <a:noFill/>
-                </a:ln>
-                <a:solidFill>
-                  <a:srgbClr val="000000"/>
-                </a:solidFill>
-                <a:effectLst/>
-                <a:uLnTx/>
-                <a:uFillTx/>
-                <a:latin typeface="Arial"/>
-                <a:ea typeface="+mn-ea"/>
-                <a:cs typeface="+mn-cs"/>
-              </a:rPr>
-              <a:pPr marL="0" marR="0" lvl="0" indent="0" algn="ctr" defTabSz="1088776" rtl="0" eaLnBrk="1" fontAlgn="auto" latinLnBrk="0" hangingPunct="1">
-                <a:lnSpc>
-                  <a:spcPct val="100000"/>
-                </a:lnSpc>
-                <a:spcBef>
-                  <a:spcPts val="0"/>
-                </a:spcBef>
-                <a:spcAft>
-                  <a:spcPts val="0"/>
-                </a:spcAft>
-                <a:buClrTx/>
-                <a:buSzTx/>
-                <a:buFontTx/>
-                <a:buNone/>
-                <a:tabLst/>
-                <a:defRPr/>
-              </a:pPr>
-              <a:t>8</a:t>
-            </a:fld>
-            <a:endParaRPr kumimoji="0" lang="de-DE" sz="800" b="0" i="0" u="none" strike="noStrike" kern="1200" cap="none" spc="0" normalizeH="0" baseline="0" noProof="0" dirty="0">
-              <a:ln>
-                <a:noFill/>
-              </a:ln>
-              <a:solidFill>
-                <a:srgbClr val="000000"/>
-              </a:solidFill>
-              <a:effectLst/>
-              <a:uLnTx/>
-              <a:uFillTx/>
-              <a:latin typeface="Arial"/>
-              <a:ea typeface="+mn-ea"/>
-              <a:cs typeface="+mn-cs"/>
-            </a:endParaRPr>
-          </a:p>
-        </p:txBody>
-      </p:sp>
-    </p:spTree>
-    <p:extLst>
-      <p:ext uri="{BB962C8B-B14F-4D97-AF65-F5344CB8AC3E}">
-        <p14:creationId xmlns:p14="http://schemas.microsoft.com/office/powerpoint/2010/main" val="1139963899"/>
-      </p:ext>
-    </p:extLst>
-  </p:cSld>
-  <p:clrMapOvr>
-    <a:masterClrMapping/>
-  </p:clrMapOvr>
-</p:notes>
-</file>
-
-<file path=ppt/notesSlides/notesSlide6.xml><?xml version="1.0" encoding="utf-8"?>
-<p:notes xmlns:a="http://schemas.openxmlformats.org/drawingml/2006/main" xmlns:r="http://schemas.openxmlformats.org/officeDocument/2006/relationships" xmlns:p="http://schemas.openxmlformats.org/presentationml/2006/main">
-  <p:cSld>
-    <p:spTree>
-      <p:nvGrpSpPr>
-        <p:cNvPr id="1" name=""/>
-        <p:cNvGrpSpPr/>
-        <p:nvPr/>
-      </p:nvGrpSpPr>
-      <p:grpSpPr>
-        <a:xfrm>
-          <a:off x="0" y="0"/>
-          <a:ext cx="0" cy="0"/>
-          <a:chOff x="0" y="0"/>
-          <a:chExt cx="0" cy="0"/>
-        </a:xfrm>
-      </p:grpSpPr>
-      <p:sp>
-        <p:nvSpPr>
-          <p:cNvPr id="2" name="Slide Image Placeholder 1"/>
-          <p:cNvSpPr>
-            <a:spLocks noGrp="1" noRot="1" noChangeAspect="1"/>
-          </p:cNvSpPr>
-          <p:nvPr>
-            <p:ph type="sldImg"/>
-          </p:nvPr>
-        </p:nvSpPr>
-        <p:spPr/>
-      </p:sp>
-      <p:sp>
-        <p:nvSpPr>
-          <p:cNvPr id="3" name="Notes Placeholder 2"/>
-          <p:cNvSpPr>
-            <a:spLocks noGrp="1"/>
-          </p:cNvSpPr>
-          <p:nvPr>
-            <p:ph type="body" idx="1"/>
-          </p:nvPr>
-        </p:nvSpPr>
-        <p:spPr/>
-        <p:txBody>
-          <a:bodyPr/>
-          <a:lstStyle/>
-          <a:p>
-            <a:pPr marL="342900" indent="-342900">
-              <a:buFontTx/>
-              <a:buChar char="-"/>
-            </a:pPr>
-            <a:r>
-              <a:rPr lang="en-US" dirty="0"/>
-              <a:t>Show all namespaces in cluster</a:t>
-            </a:r>
-          </a:p>
-          <a:p>
-            <a:pPr marL="522900" lvl="1" indent="-342900">
-              <a:buFontTx/>
-              <a:buChar char="-"/>
-            </a:pPr>
-            <a:r>
-              <a:rPr lang="en-US" dirty="0"/>
-              <a:t>If not yet mentioned, explain that everyone has their own namespace. Please be a good citizen and don’t sabotage the others.</a:t>
-            </a:r>
-          </a:p>
-          <a:p>
-            <a:pPr marL="342900" indent="-342900">
-              <a:buFontTx/>
-              <a:buChar char="-"/>
-            </a:pPr>
-            <a:r>
-              <a:rPr lang="en-US" dirty="0"/>
-              <a:t>Query a pod from a dedicated namespace ( e.g. </a:t>
-            </a:r>
-            <a:r>
-              <a:rPr lang="en-US" dirty="0" err="1"/>
-              <a:t>kube</a:t>
-            </a:r>
-            <a:r>
-              <a:rPr lang="en-US" dirty="0"/>
-              <a:t>-system), explain “-n &lt;namespace</a:t>
-            </a:r>
-            <a:r>
-              <a:rPr lang="en-US"/>
-              <a:t>&gt;” flag</a:t>
-            </a:r>
-            <a:endParaRPr lang="en-US" dirty="0"/>
-          </a:p>
-        </p:txBody>
-      </p:sp>
-      <p:sp>
-        <p:nvSpPr>
-          <p:cNvPr id="4" name="Slide Number Placeholder 3"/>
-          <p:cNvSpPr>
-            <a:spLocks noGrp="1"/>
-          </p:cNvSpPr>
-          <p:nvPr>
-            <p:ph type="sldNum" sz="quarter" idx="10"/>
-          </p:nvPr>
-        </p:nvSpPr>
-        <p:spPr/>
-        <p:txBody>
-          <a:bodyPr/>
-          <a:lstStyle/>
-          <a:p>
-            <a:pPr marL="0" marR="0" lvl="0" indent="0" algn="ctr" defTabSz="1088776" rtl="0" eaLnBrk="1" fontAlgn="auto" latinLnBrk="0" hangingPunct="1">
-              <a:lnSpc>
-                <a:spcPct val="100000"/>
-              </a:lnSpc>
-              <a:spcBef>
-                <a:spcPts val="0"/>
-              </a:spcBef>
-              <a:spcAft>
-                <a:spcPts val="0"/>
-              </a:spcAft>
-              <a:buClrTx/>
-              <a:buSzTx/>
-              <a:buFontTx/>
-              <a:buNone/>
-              <a:tabLst/>
-              <a:defRPr/>
-            </a:pPr>
-            <a:fld id="{7D8C2C35-2B8A-446E-BEC0-FD36716C29AC}" type="slidenum">
-              <a:rPr kumimoji="0" lang="de-DE" sz="800" b="0" i="0" u="none" strike="noStrike" kern="1200" cap="none" spc="0" normalizeH="0" baseline="0" noProof="0" smtClean="0">
-                <a:ln>
-                  <a:noFill/>
-                </a:ln>
-                <a:solidFill>
-                  <a:srgbClr val="000000"/>
-                </a:solidFill>
-                <a:effectLst/>
-                <a:uLnTx/>
-                <a:uFillTx/>
-                <a:latin typeface="Arial"/>
-                <a:ea typeface="+mn-ea"/>
-                <a:cs typeface="+mn-cs"/>
-              </a:rPr>
-              <a:pPr marL="0" marR="0" lvl="0" indent="0" algn="ctr" defTabSz="1088776" rtl="0" eaLnBrk="1" fontAlgn="auto" latinLnBrk="0" hangingPunct="1">
-                <a:lnSpc>
-                  <a:spcPct val="100000"/>
-                </a:lnSpc>
-                <a:spcBef>
-                  <a:spcPts val="0"/>
-                </a:spcBef>
-                <a:spcAft>
-                  <a:spcPts val="0"/>
-                </a:spcAft>
-                <a:buClrTx/>
-                <a:buSzTx/>
-                <a:buFontTx/>
-                <a:buNone/>
-                <a:tabLst/>
-                <a:defRPr/>
-              </a:pPr>
-              <a:t>9</a:t>
-            </a:fld>
-            <a:endParaRPr kumimoji="0" lang="de-DE" sz="800" b="0" i="0" u="none" strike="noStrike" kern="1200" cap="none" spc="0" normalizeH="0" baseline="0" noProof="0" dirty="0">
-              <a:ln>
-                <a:noFill/>
-              </a:ln>
-              <a:solidFill>
-                <a:srgbClr val="000000"/>
-              </a:solidFill>
-              <a:effectLst/>
-              <a:uLnTx/>
-              <a:uFillTx/>
-              <a:latin typeface="Arial"/>
-              <a:ea typeface="+mn-ea"/>
-              <a:cs typeface="+mn-cs"/>
-            </a:endParaRPr>
-          </a:p>
-        </p:txBody>
-      </p:sp>
-    </p:spTree>
-    <p:extLst>
-      <p:ext uri="{BB962C8B-B14F-4D97-AF65-F5344CB8AC3E}">
-        <p14:creationId xmlns:p14="http://schemas.microsoft.com/office/powerpoint/2010/main" val="1929201043"/>
-      </p:ext>
-    </p:extLst>
-  </p:cSld>
-  <p:clrMapOvr>
-    <a:masterClrMapping/>
-  </p:clrMapOvr>
-</p:notes>
-</file>
-
-<file path=ppt/notesSlides/notesSlide7.xml><?xml version="1.0" encoding="utf-8"?>
-<p:notes xmlns:a="http://schemas.openxmlformats.org/drawingml/2006/main" xmlns:r="http://schemas.openxmlformats.org/officeDocument/2006/relationships" xmlns:p="http://schemas.openxmlformats.org/presentationml/2006/main">
-  <p:cSld>
-    <p:spTree>
-      <p:nvGrpSpPr>
-        <p:cNvPr id="1" name=""/>
-        <p:cNvGrpSpPr/>
-        <p:nvPr/>
-      </p:nvGrpSpPr>
-      <p:grpSpPr>
-        <a:xfrm>
-          <a:off x="0" y="0"/>
-          <a:ext cx="0" cy="0"/>
-          <a:chOff x="0" y="0"/>
-          <a:chExt cx="0" cy="0"/>
-        </a:xfrm>
-      </p:grpSpPr>
-      <p:sp>
-        <p:nvSpPr>
-          <p:cNvPr id="4" name="Slide Number Placeholder 3"/>
-          <p:cNvSpPr>
-            <a:spLocks noGrp="1"/>
-          </p:cNvSpPr>
-          <p:nvPr>
-            <p:ph type="sldNum" sz="quarter" idx="10"/>
-          </p:nvPr>
-        </p:nvSpPr>
-        <p:spPr/>
-        <p:txBody>
-          <a:bodyPr/>
-          <a:lstStyle/>
-          <a:p>
             <a:fld id="{7D8C2C35-2B8A-446E-BEC0-FD36716C29AC}" type="slidenum">
               <a:rPr lang="de-DE" smtClean="0"/>
               <a:pPr/>
-              <a:t>10</a:t>
+              <a:t>7</a:t>
             </a:fld>
             <a:endParaRPr lang="de-DE" dirty="0"/>
           </a:p>
@@ -4840,14 +4509,6 @@
 <file path=ppt/slideLayouts/slideLayout15.xml><?xml version="1.0" encoding="utf-8"?>
 <p:sldLayout xmlns:a="http://schemas.openxmlformats.org/drawingml/2006/main" xmlns:r="http://schemas.openxmlformats.org/officeDocument/2006/relationships" xmlns:p="http://schemas.openxmlformats.org/presentationml/2006/main" preserve="1" userDrawn="1">
   <p:cSld name="Quote">
-    <p:bg>
-      <p:bgPr>
-        <a:solidFill>
-          <a:schemeClr val="bg1"/>
-        </a:solidFill>
-        <a:effectLst/>
-      </p:bgPr>
-    </p:bg>
     <p:spTree>
       <p:nvGrpSpPr>
         <p:cNvPr id="1" name=""/>
@@ -28413,7 +28074,7 @@
       </p:ext>
     </p:extLst>
   </p:cSld>
-  <p:clrMap bg1="dk1" tx1="lt1" bg2="dk2" tx2="lt2" accent1="accent1" accent2="accent2" accent3="accent3" accent4="accent4" accent5="accent5" accent6="accent6" hlink="hlink" folHlink="folHlink"/>
+  <p:clrMap bg1="lt1" tx1="dk1" bg2="lt2" tx2="dk2" accent1="accent1" accent2="accent2" accent3="accent3" accent4="accent4" accent5="accent5" accent6="accent6" hlink="hlink" folHlink="folHlink"/>
   <p:sldLayoutIdLst>
     <p:sldLayoutId id="2147483772" r:id="rId1"/>
     <p:sldLayoutId id="2147483776" r:id="rId2"/>
@@ -32253,30 +31914,6 @@
       </p:sp>
       <p:pic>
         <p:nvPicPr>
-          <p:cNvPr id="3" name="Picture Placeholder 2"/>
-          <p:cNvPicPr>
-            <a:picLocks noGrp="1" noChangeAspect="1"/>
-          </p:cNvPicPr>
-          <p:nvPr>
-            <p:ph type="pic" sz="quarter" idx="12"/>
-          </p:nvPr>
-        </p:nvPicPr>
-        <p:blipFill>
-          <a:blip r:embed="rId3"/>
-          <a:srcRect t="3112" b="3112"/>
-          <a:stretch>
-            <a:fillRect/>
-          </a:stretch>
-        </p:blipFill>
-        <p:spPr>
-          <a:xfrm>
-            <a:off x="1" y="0"/>
-            <a:ext cx="12195175" cy="3430006"/>
-          </a:xfrm>
-        </p:spPr>
-      </p:pic>
-      <p:pic>
-        <p:nvPicPr>
           <p:cNvPr id="4" name="Picture 3" descr="cid:image003.png@01D31CC6.A08B1C50">
             <a:extLst>
               <a:ext uri="{FF2B5EF4-FFF2-40B4-BE49-F238E27FC236}">
@@ -32290,7 +31927,7 @@
           <p:nvPr/>
         </p:nvPicPr>
         <p:blipFill>
-          <a:blip r:embed="rId4">
+          <a:blip r:embed="rId3">
             <a:extLst>
               <a:ext uri="{28A0092B-C50C-407E-A947-70E740481C1C}">
                 <a14:useLocalDpi xmlns:a14="http://schemas.microsoft.com/office/drawing/2010/main" val="0"/>
@@ -32350,7 +31987,7 @@
           <p:nvPr/>
         </p:nvPicPr>
         <p:blipFill>
-          <a:blip r:embed="rId5"/>
+          <a:blip r:embed="rId4"/>
           <a:stretch>
             <a:fillRect/>
           </a:stretch>
@@ -32365,92 +32002,36 @@
           </a:prstGeom>
         </p:spPr>
       </p:pic>
-      <p:sp>
-        <p:nvSpPr>
-          <p:cNvPr id="2" name="TextBox 1">
+      <p:pic>
+        <p:nvPicPr>
+          <p:cNvPr id="9" name="Illustration" descr="Example of an illustration" title="Illustration for title slide">
             <a:extLst>
               <a:ext uri="{FF2B5EF4-FFF2-40B4-BE49-F238E27FC236}">
-                <a16:creationId xmlns:a16="http://schemas.microsoft.com/office/drawing/2014/main" id="{6D17BB41-A1D3-4E3B-A543-43EF99E7C673}"/>
+                <a16:creationId xmlns:a16="http://schemas.microsoft.com/office/drawing/2014/main" id="{6FC9079A-30E7-4F45-AA0D-B14961C567BB}"/>
               </a:ext>
             </a:extLst>
           </p:cNvPr>
-          <p:cNvSpPr txBox="1"/>
-          <p:nvPr/>
-        </p:nvSpPr>
-        <p:spPr>
-          <a:xfrm rot="20422960">
-            <a:off x="3321980" y="3016304"/>
-            <a:ext cx="2381388" cy="615553"/>
-          </a:xfrm>
-          <a:prstGeom prst="rect">
-            <a:avLst/>
-          </a:prstGeom>
-          <a:solidFill>
-            <a:schemeClr val="accent1"/>
-          </a:solidFill>
-        </p:spPr>
-        <p:txBody>
-          <a:bodyPr wrap="square" lIns="0" tIns="0" rIns="0" bIns="0" rtlCol="0">
-            <a:spAutoFit/>
-          </a:bodyPr>
-          <a:lstStyle/>
-          <a:p>
-            <a:pPr algn="ctr" fontAlgn="base">
-              <a:spcBef>
-                <a:spcPct val="50000"/>
-              </a:spcBef>
-              <a:spcAft>
-                <a:spcPct val="0"/>
-              </a:spcAft>
-              <a:buClr>
-                <a:srgbClr val="F0AB00"/>
-              </a:buClr>
-              <a:buSzPct val="80000"/>
-            </a:pPr>
-            <a:r>
-              <a:rPr lang="de-DE" sz="2000" kern="0" dirty="0">
-                <a:ea typeface="Arial Unicode MS" pitchFamily="34" charset="-128"/>
-                <a:cs typeface="Arial Unicode MS" pitchFamily="34" charset="-128"/>
-              </a:rPr>
-              <a:t>D R A F T</a:t>
-            </a:r>
-            <a:br>
-              <a:rPr lang="de-DE" sz="2000" kern="0" dirty="0">
-                <a:ea typeface="Arial Unicode MS" pitchFamily="34" charset="-128"/>
-                <a:cs typeface="Arial Unicode MS" pitchFamily="34" charset="-128"/>
-              </a:rPr>
-            </a:br>
-            <a:r>
-              <a:rPr lang="de-DE" sz="2000" kern="0" dirty="0" err="1">
-                <a:ea typeface="Arial Unicode MS" pitchFamily="34" charset="-128"/>
-                <a:cs typeface="Arial Unicode MS" pitchFamily="34" charset="-128"/>
-              </a:rPr>
-              <a:t>Under</a:t>
-            </a:r>
-            <a:r>
-              <a:rPr lang="de-DE" sz="2000" kern="0" dirty="0">
-                <a:ea typeface="Arial Unicode MS" pitchFamily="34" charset="-128"/>
-                <a:cs typeface="Arial Unicode MS" pitchFamily="34" charset="-128"/>
-              </a:rPr>
-              <a:t> </a:t>
-            </a:r>
-            <a:r>
-              <a:rPr lang="de-DE" sz="2000" kern="0" dirty="0" err="1">
-                <a:ea typeface="Arial Unicode MS" pitchFamily="34" charset="-128"/>
-                <a:cs typeface="Arial Unicode MS" pitchFamily="34" charset="-128"/>
-              </a:rPr>
-              <a:t>Construction</a:t>
-            </a:r>
-            <a:r>
-              <a:rPr lang="de-DE" sz="2000" kern="0" dirty="0">
-                <a:ea typeface="Arial Unicode MS" pitchFamily="34" charset="-128"/>
-                <a:cs typeface="Arial Unicode MS" pitchFamily="34" charset="-128"/>
-              </a:rPr>
-              <a:t> !</a:t>
-            </a:r>
-          </a:p>
-        </p:txBody>
-      </p:sp>
+          <p:cNvPicPr>
+            <a:picLocks noGrp="1" noChangeAspect="1"/>
+          </p:cNvPicPr>
+          <p:nvPr>
+            <p:ph type="pic" sz="quarter" idx="12"/>
+          </p:nvPr>
+        </p:nvPicPr>
+        <p:blipFill>
+          <a:blip r:embed="rId5"/>
+          <a:srcRect t="3112" b="3112"/>
+          <a:stretch>
+            <a:fillRect/>
+          </a:stretch>
+        </p:blipFill>
+        <p:spPr bwMode="gray">
+          <a:xfrm>
+            <a:off x="0" y="0"/>
+            <a:ext cx="12195174" cy="3430006"/>
+          </a:xfrm>
+        </p:spPr>
+      </p:pic>
     </p:spTree>
     <p:extLst>
       <p:ext uri="{BB962C8B-B14F-4D97-AF65-F5344CB8AC3E}">
@@ -32461,32 +32042,6 @@
   <p:clrMapOvr>
     <a:masterClrMapping/>
   </p:clrMapOvr>
-</p:sld>
-</file>
-
-<file path=ppt/slides/slide10.xml><?xml version="1.0" encoding="utf-8"?>
-<p:sld xmlns:a="http://schemas.openxmlformats.org/drawingml/2006/main" xmlns:r="http://schemas.openxmlformats.org/officeDocument/2006/relationships" xmlns:p="http://schemas.openxmlformats.org/presentationml/2006/main" show="0">
-  <p:cSld>
-    <p:spTree>
-      <p:nvGrpSpPr>
-        <p:cNvPr id="1" name=""/>
-        <p:cNvGrpSpPr/>
-        <p:nvPr/>
-      </p:nvGrpSpPr>
-      <p:grpSpPr>
-        <a:xfrm>
-          <a:off x="0" y="0"/>
-          <a:ext cx="0" cy="0"/>
-          <a:chOff x="0" y="0"/>
-          <a:chExt cx="0" cy="0"/>
-        </a:xfrm>
-      </p:grpSpPr>
-    </p:spTree>
-  </p:cSld>
-  <p:clrMapOvr>
-    <a:masterClrMapping/>
-  </p:clrMapOvr>
-  <p:transition spd="med"/>
 </p:sld>
 </file>
 
@@ -32528,7 +32083,7 @@
             <a:avLst/>
           </a:prstGeom>
           <a:solidFill>
-            <a:schemeClr val="bg2">
+            <a:schemeClr val="tx2">
               <a:alpha val="97000"/>
             </a:schemeClr>
           </a:solidFill>
@@ -32693,7 +32248,7 @@
             </a:solidFill>
             <a:ln>
               <a:solidFill>
-                <a:schemeClr val="bg1"/>
+                <a:schemeClr val="tx1"/>
               </a:solidFill>
               <a:headEnd/>
               <a:tailEnd/>
@@ -32763,7 +32318,9 @@
             </a:prstGeom>
             <a:noFill/>
             <a:ln>
-              <a:noFill/>
+              <a:solidFill>
+                <a:schemeClr val="tx1"/>
+              </a:solidFill>
             </a:ln>
           </p:spPr>
           <p:txBody>
@@ -32826,7 +32383,7 @@
           </a:solidFill>
           <a:ln>
             <a:solidFill>
-              <a:schemeClr val="bg1"/>
+              <a:schemeClr val="tx1"/>
             </a:solidFill>
             <a:headEnd/>
             <a:tailEnd/>
@@ -33180,7 +32737,7 @@
           </a:solidFill>
           <a:ln>
             <a:solidFill>
-              <a:schemeClr val="bg1"/>
+              <a:schemeClr val="tx1"/>
             </a:solidFill>
             <a:headEnd/>
             <a:tailEnd/>
@@ -33297,9 +32854,7 @@
             </a:schemeClr>
           </a:solidFill>
           <a:ln>
-            <a:solidFill>
-              <a:schemeClr val="bg1"/>
-            </a:solidFill>
+            <a:noFill/>
             <a:headEnd/>
             <a:tailEnd/>
           </a:ln>
@@ -33384,7 +32939,7 @@
             <a:grpFill/>
             <a:ln>
               <a:solidFill>
-                <a:schemeClr val="bg1"/>
+                <a:schemeClr val="tx1"/>
               </a:solidFill>
               <a:headEnd/>
               <a:tailEnd/>
@@ -33422,7 +32977,7 @@
                 <a:buSzPct val="80000"/>
               </a:pPr>
               <a:r>
-                <a:rPr lang="en-US" sz="1000" kern="0">
+                <a:rPr lang="en-US" sz="1000" kern="0" dirty="0" err="1">
                   <a:solidFill>
                     <a:srgbClr val="000000"/>
                   </a:solidFill>
@@ -33466,7 +33021,7 @@
             <a:grpFill/>
             <a:ln w="9525">
               <a:solidFill>
-                <a:schemeClr val="bg1"/>
+                <a:schemeClr val="tx1"/>
               </a:solidFill>
               <a:headEnd type="none" w="med" len="med"/>
               <a:tailEnd type="none" w="med" len="med"/>
@@ -33625,7 +33180,7 @@
               <a:grpFill/>
               <a:ln>
                 <a:solidFill>
-                  <a:schemeClr val="bg1"/>
+                  <a:schemeClr val="tx1"/>
                 </a:solidFill>
                 <a:headEnd/>
                 <a:tailEnd/>
@@ -33743,7 +33298,7 @@
               <a:grpFill/>
               <a:ln w="9525">
                 <a:solidFill>
-                  <a:schemeClr val="bg1"/>
+                  <a:schemeClr val="tx1"/>
                 </a:solidFill>
                 <a:headEnd type="none" w="med" len="med"/>
                 <a:tailEnd type="none" w="med" len="med"/>
@@ -33819,7 +33374,7 @@
           </a:prstGeom>
           <a:ln w="9525">
             <a:solidFill>
-              <a:schemeClr val="bg1"/>
+              <a:schemeClr val="tx1"/>
             </a:solidFill>
             <a:headEnd type="none" w="med" len="med"/>
             <a:tailEnd type="none" w="med" len="med"/>
@@ -33865,7 +33420,7 @@
           </a:solidFill>
           <a:ln>
             <a:solidFill>
-              <a:schemeClr val="bg1"/>
+              <a:schemeClr val="tx1"/>
             </a:solidFill>
             <a:headEnd/>
             <a:tailEnd/>
@@ -34061,7 +33616,7 @@
               </a:solidFill>
               <a:ln>
                 <a:solidFill>
-                  <a:schemeClr val="bg1"/>
+                  <a:schemeClr val="tx1"/>
                 </a:solidFill>
                 <a:headEnd/>
                 <a:tailEnd/>
@@ -34143,7 +33698,7 @@
               <a:grpFill/>
               <a:ln w="9525">
                 <a:solidFill>
-                  <a:schemeClr val="bg1"/>
+                  <a:schemeClr val="tx1"/>
                 </a:solidFill>
                 <a:headEnd type="none" w="med" len="med"/>
                 <a:tailEnd type="none" w="med" len="med"/>
@@ -34260,7 +33815,7 @@
           </a:solidFill>
           <a:ln>
             <a:solidFill>
-              <a:schemeClr val="bg1"/>
+              <a:schemeClr val="tx1"/>
             </a:solidFill>
             <a:headEnd/>
             <a:tailEnd/>
@@ -34422,7 +33977,7 @@
           </a:solidFill>
           <a:ln>
             <a:solidFill>
-              <a:schemeClr val="bg1"/>
+              <a:schemeClr val="tx1"/>
             </a:solidFill>
             <a:headEnd/>
             <a:tailEnd/>
@@ -34584,7 +34139,7 @@
           </a:solidFill>
           <a:ln>
             <a:solidFill>
-              <a:schemeClr val="bg1"/>
+              <a:schemeClr val="tx1"/>
             </a:solidFill>
             <a:headEnd/>
             <a:tailEnd/>
@@ -34746,7 +34301,7 @@
           </a:solidFill>
           <a:ln>
             <a:solidFill>
-              <a:schemeClr val="bg1"/>
+              <a:schemeClr val="tx1"/>
             </a:solidFill>
             <a:headEnd/>
             <a:tailEnd/>
@@ -35031,7 +34586,7 @@
           </a:solidFill>
           <a:ln>
             <a:solidFill>
-              <a:schemeClr val="bg1"/>
+              <a:schemeClr val="tx1"/>
             </a:solidFill>
             <a:headEnd/>
             <a:tailEnd/>
@@ -35106,7 +34661,7 @@
           </a:solidFill>
           <a:ln>
             <a:solidFill>
-              <a:schemeClr val="bg1"/>
+              <a:schemeClr val="tx1"/>
             </a:solidFill>
             <a:headEnd/>
             <a:tailEnd/>
@@ -35181,7 +34736,7 @@
           </a:solidFill>
           <a:ln>
             <a:solidFill>
-              <a:schemeClr val="bg1"/>
+              <a:schemeClr val="tx1"/>
             </a:solidFill>
             <a:headEnd/>
             <a:tailEnd/>
@@ -35618,7 +35173,7 @@
           </a:solidFill>
           <a:ln>
             <a:solidFill>
-              <a:schemeClr val="bg1"/>
+              <a:schemeClr val="tx1"/>
             </a:solidFill>
             <a:headEnd/>
             <a:tailEnd/>
@@ -35945,7 +35500,7 @@
             <a:grpFill/>
             <a:ln>
               <a:solidFill>
-                <a:schemeClr val="bg1"/>
+                <a:schemeClr val="tx1"/>
               </a:solidFill>
               <a:headEnd/>
               <a:tailEnd/>
@@ -36025,6 +35580,11 @@
               <a:avLst/>
             </a:prstGeom>
             <a:grpFill/>
+            <a:ln>
+              <a:solidFill>
+                <a:schemeClr val="tx1"/>
+              </a:solidFill>
+            </a:ln>
           </p:spPr>
         </p:pic>
       </p:grpSp>
@@ -36055,7 +35615,7 @@
           </a:solidFill>
           <a:ln>
             <a:solidFill>
-              <a:schemeClr val="bg1"/>
+              <a:schemeClr val="tx1"/>
             </a:solidFill>
             <a:headEnd/>
             <a:tailEnd/>
@@ -36341,7 +35901,7 @@
             <a:grpFill/>
             <a:ln>
               <a:solidFill>
-                <a:schemeClr val="bg1"/>
+                <a:schemeClr val="tx1"/>
               </a:solidFill>
               <a:headEnd/>
               <a:tailEnd/>
@@ -36421,6 +35981,11 @@
               <a:avLst/>
             </a:prstGeom>
             <a:grpFill/>
+            <a:ln>
+              <a:solidFill>
+                <a:schemeClr val="tx1"/>
+              </a:solidFill>
+            </a:ln>
           </p:spPr>
         </p:pic>
       </p:grpSp>
@@ -36529,7 +36094,7 @@
             <a:grpFill/>
             <a:ln>
               <a:solidFill>
-                <a:schemeClr val="bg1"/>
+                <a:schemeClr val="tx1"/>
               </a:solidFill>
               <a:headEnd/>
               <a:tailEnd/>
@@ -36605,7 +36170,7 @@
             <a:grpFill/>
             <a:ln w="9525">
               <a:solidFill>
-                <a:schemeClr val="bg1"/>
+                <a:schemeClr val="tx1"/>
               </a:solidFill>
               <a:headEnd type="none" w="med" len="med"/>
               <a:tailEnd type="none" w="med" len="med"/>
@@ -36680,7 +36245,7 @@
             <a:grpFill/>
             <a:ln>
               <a:solidFill>
-                <a:schemeClr val="bg1"/>
+                <a:schemeClr val="tx1"/>
               </a:solidFill>
               <a:headEnd/>
               <a:tailEnd/>
@@ -36756,7 +36321,7 @@
             <a:grpFill/>
             <a:ln w="9525">
               <a:solidFill>
-                <a:schemeClr val="bg1"/>
+                <a:schemeClr val="tx1"/>
               </a:solidFill>
               <a:headEnd type="none" w="med" len="med"/>
               <a:tailEnd type="none" w="med" len="med"/>
@@ -36856,7 +36421,7 @@
             </a:solidFill>
             <a:ln>
               <a:solidFill>
-                <a:schemeClr val="bg1"/>
+                <a:schemeClr val="tx1"/>
               </a:solidFill>
               <a:headEnd/>
               <a:tailEnd/>
@@ -36931,7 +36496,7 @@
             </a:prstGeom>
             <a:ln w="9525">
               <a:solidFill>
-                <a:schemeClr val="bg1"/>
+                <a:schemeClr val="tx1"/>
               </a:solidFill>
               <a:headEnd type="none" w="med" len="med"/>
               <a:tailEnd type="none" w="med" len="med"/>
@@ -37009,7 +36574,7 @@
             </a:solidFill>
             <a:ln>
               <a:solidFill>
-                <a:schemeClr val="bg1"/>
+                <a:schemeClr val="tx1"/>
               </a:solidFill>
               <a:headEnd/>
               <a:tailEnd/>
@@ -37084,7 +36649,7 @@
             </a:prstGeom>
             <a:ln w="9525">
               <a:solidFill>
-                <a:schemeClr val="bg1"/>
+                <a:schemeClr val="tx1"/>
               </a:solidFill>
               <a:headEnd type="none" w="med" len="med"/>
               <a:tailEnd type="none" w="med" len="med"/>
@@ -37184,7 +36749,7 @@
             <a:grpFill/>
             <a:ln>
               <a:solidFill>
-                <a:schemeClr val="bg1"/>
+                <a:schemeClr val="tx1"/>
               </a:solidFill>
               <a:headEnd/>
               <a:tailEnd/>
@@ -37260,7 +36825,7 @@
             <a:grpFill/>
             <a:ln w="9525">
               <a:solidFill>
-                <a:schemeClr val="bg1"/>
+                <a:schemeClr val="tx1"/>
               </a:solidFill>
               <a:headEnd type="none" w="med" len="med"/>
               <a:tailEnd type="none" w="med" len="med"/>
@@ -37335,7 +36900,7 @@
             <a:grpFill/>
             <a:ln>
               <a:solidFill>
-                <a:schemeClr val="bg1"/>
+                <a:schemeClr val="tx1"/>
               </a:solidFill>
               <a:headEnd/>
               <a:tailEnd/>
@@ -37411,7 +36976,7 @@
             <a:grpFill/>
             <a:ln w="9525">
               <a:solidFill>
-                <a:schemeClr val="bg1"/>
+                <a:schemeClr val="tx1"/>
               </a:solidFill>
               <a:headEnd type="none" w="med" len="med"/>
               <a:tailEnd type="none" w="med" len="med"/>
@@ -37512,7 +37077,7 @@
             <a:grpFill/>
             <a:ln>
               <a:solidFill>
-                <a:schemeClr val="bg1"/>
+                <a:schemeClr val="tx1"/>
               </a:solidFill>
               <a:headEnd/>
               <a:tailEnd/>
@@ -37588,7 +37153,7 @@
             <a:grpFill/>
             <a:ln w="9525">
               <a:solidFill>
-                <a:schemeClr val="bg1"/>
+                <a:schemeClr val="tx1"/>
               </a:solidFill>
               <a:headEnd type="none" w="med" len="med"/>
               <a:tailEnd type="none" w="med" len="med"/>
@@ -37663,7 +37228,7 @@
             <a:grpFill/>
             <a:ln>
               <a:solidFill>
-                <a:schemeClr val="bg1"/>
+                <a:schemeClr val="tx1"/>
               </a:solidFill>
               <a:headEnd/>
               <a:tailEnd/>
@@ -37739,7 +37304,7 @@
             <a:grpFill/>
             <a:ln w="9525">
               <a:solidFill>
-                <a:schemeClr val="bg1"/>
+                <a:schemeClr val="tx1"/>
               </a:solidFill>
               <a:headEnd type="none" w="med" len="med"/>
               <a:tailEnd type="none" w="med" len="med"/>
@@ -38935,11 +38500,11 @@
             <a:avLst/>
           </a:prstGeom>
           <a:solidFill>
-            <a:schemeClr val="tx1"/>
+            <a:schemeClr val="tx2"/>
           </a:solidFill>
           <a:ln>
             <a:solidFill>
-              <a:schemeClr val="bg1"/>
+              <a:schemeClr val="tx1"/>
             </a:solidFill>
             <a:headEnd/>
             <a:tailEnd/>
@@ -38984,6 +38549,9 @@
                 <a:ln>
                   <a:noFill/>
                 </a:ln>
+                <a:solidFill>
+                  <a:schemeClr val="tx1"/>
+                </a:solidFill>
                 <a:effectLst/>
                 <a:uLnTx/>
                 <a:uFillTx/>
@@ -38996,6 +38564,9 @@
               <a:ln>
                 <a:noFill/>
               </a:ln>
+              <a:solidFill>
+                <a:schemeClr val="tx1"/>
+              </a:solidFill>
               <a:effectLst/>
               <a:uLnTx/>
               <a:uFillTx/>
@@ -39191,7 +38762,7 @@
           </a:solidFill>
           <a:ln w="9525" algn="ctr">
             <a:solidFill>
-              <a:schemeClr val="bg1"/>
+              <a:schemeClr val="tx1"/>
             </a:solidFill>
             <a:miter lim="800000"/>
             <a:headEnd/>
@@ -39220,9 +38791,6 @@
             </a:pPr>
             <a:r>
               <a:rPr lang="de-DE" sz="700" b="1" kern="0" dirty="0">
-                <a:solidFill>
-                  <a:schemeClr val="bg1"/>
-                </a:solidFill>
                 <a:ea typeface="Arial Unicode MS" pitchFamily="34" charset="-128"/>
                 <a:cs typeface="Arial Unicode MS" pitchFamily="34" charset="-128"/>
               </a:rPr>
@@ -39233,9 +38801,6 @@
                 <a:ln>
                   <a:noFill/>
                 </a:ln>
-                <a:solidFill>
-                  <a:schemeClr val="bg1"/>
-                </a:solidFill>
                 <a:effectLst/>
                 <a:uLnTx/>
                 <a:uFillTx/>
@@ -39249,9 +38814,6 @@
                 <a:ln>
                   <a:noFill/>
                 </a:ln>
-                <a:solidFill>
-                  <a:schemeClr val="bg1"/>
-                </a:solidFill>
                 <a:effectLst/>
                 <a:uLnTx/>
                 <a:uFillTx/>
@@ -39265,9 +38827,6 @@
                 <a:ln>
                   <a:noFill/>
                 </a:ln>
-                <a:solidFill>
-                  <a:schemeClr val="bg1"/>
-                </a:solidFill>
                 <a:effectLst/>
                 <a:uLnTx/>
                 <a:uFillTx/>
@@ -39280,9 +38839,6 @@
               <a:ln>
                 <a:noFill/>
               </a:ln>
-              <a:solidFill>
-                <a:schemeClr val="bg1"/>
-              </a:solidFill>
               <a:effectLst/>
               <a:uLnTx/>
               <a:uFillTx/>
@@ -39317,7 +38873,7 @@
           </a:solidFill>
           <a:ln w="9525" algn="ctr">
             <a:solidFill>
-              <a:schemeClr val="bg1"/>
+              <a:schemeClr val="tx1"/>
             </a:solidFill>
             <a:miter lim="800000"/>
             <a:headEnd/>
@@ -39349,9 +38905,6 @@
                 <a:ln>
                   <a:noFill/>
                 </a:ln>
-                <a:solidFill>
-                  <a:schemeClr val="bg1"/>
-                </a:solidFill>
                 <a:effectLst/>
                 <a:uLnTx/>
                 <a:uFillTx/>
@@ -39365,9 +38918,6 @@
                 <a:ln>
                   <a:noFill/>
                 </a:ln>
-                <a:solidFill>
-                  <a:schemeClr val="bg1"/>
-                </a:solidFill>
                 <a:effectLst/>
                 <a:uLnTx/>
                 <a:uFillTx/>
@@ -39381,9 +38931,6 @@
                 <a:ln>
                   <a:noFill/>
                 </a:ln>
-                <a:solidFill>
-                  <a:schemeClr val="bg1"/>
-                </a:solidFill>
                 <a:effectLst/>
                 <a:uLnTx/>
                 <a:uFillTx/>
@@ -39396,9 +38943,6 @@
                 <a:ln>
                   <a:noFill/>
                 </a:ln>
-                <a:solidFill>
-                  <a:schemeClr val="bg1"/>
-                </a:solidFill>
                 <a:effectLst/>
                 <a:uLnTx/>
                 <a:uFillTx/>
@@ -39411,9 +38955,6 @@
               <a:ln>
                 <a:noFill/>
               </a:ln>
-              <a:solidFill>
-                <a:schemeClr val="bg1"/>
-              </a:solidFill>
               <a:effectLst/>
               <a:uLnTx/>
               <a:uFillTx/>
@@ -39444,9 +38985,7 @@
             <a:avLst/>
           </a:prstGeom>
           <a:solidFill>
-            <a:schemeClr val="tx1">
-              <a:lumMod val="75000"/>
-            </a:schemeClr>
+            <a:schemeClr val="tx2"/>
           </a:solidFill>
           <a:ln>
             <a:solidFill>
@@ -39519,9 +39058,7 @@
             <a:avLst/>
           </a:prstGeom>
           <a:solidFill>
-            <a:schemeClr val="tx1">
-              <a:lumMod val="75000"/>
-            </a:schemeClr>
+            <a:schemeClr val="bg1"/>
           </a:solidFill>
           <a:ln>
             <a:solidFill>
@@ -39684,7 +39221,9 @@
           <a:prstGeom prst="rect">
             <a:avLst/>
           </a:prstGeom>
-          <a:noFill/>
+          <a:solidFill>
+            <a:schemeClr val="tx2"/>
+          </a:solidFill>
           <a:ln>
             <a:noFill/>
           </a:ln>
@@ -39821,7 +39360,7 @@
           </a:solidFill>
           <a:ln w="9525" algn="ctr">
             <a:solidFill>
-              <a:schemeClr val="bg1"/>
+              <a:schemeClr val="tx1"/>
             </a:solidFill>
             <a:miter lim="800000"/>
             <a:headEnd/>
@@ -39850,9 +39389,6 @@
             </a:pPr>
             <a:r>
               <a:rPr lang="de-DE" sz="700" b="1" kern="0" dirty="0">
-                <a:solidFill>
-                  <a:schemeClr val="bg1"/>
-                </a:solidFill>
                 <a:ea typeface="Arial Unicode MS" pitchFamily="34" charset="-128"/>
                 <a:cs typeface="Arial Unicode MS" pitchFamily="34" charset="-128"/>
               </a:rPr>
@@ -39863,9 +39399,6 @@
                 <a:ln>
                   <a:noFill/>
                 </a:ln>
-                <a:solidFill>
-                  <a:schemeClr val="bg1"/>
-                </a:solidFill>
                 <a:effectLst/>
                 <a:uLnTx/>
                 <a:uFillTx/>
@@ -39879,9 +39412,6 @@
                 <a:ln>
                   <a:noFill/>
                 </a:ln>
-                <a:solidFill>
-                  <a:schemeClr val="bg1"/>
-                </a:solidFill>
                 <a:effectLst/>
                 <a:uLnTx/>
                 <a:uFillTx/>
@@ -39895,9 +39425,6 @@
                 <a:ln>
                   <a:noFill/>
                 </a:ln>
-                <a:solidFill>
-                  <a:schemeClr val="bg1"/>
-                </a:solidFill>
                 <a:effectLst/>
                 <a:uLnTx/>
                 <a:uFillTx/>
@@ -39910,9 +39437,6 @@
               <a:ln>
                 <a:noFill/>
               </a:ln>
-              <a:solidFill>
-                <a:schemeClr val="bg1"/>
-              </a:solidFill>
               <a:effectLst/>
               <a:uLnTx/>
               <a:uFillTx/>
@@ -39947,7 +39471,7 @@
           </a:solidFill>
           <a:ln w="9525" algn="ctr">
             <a:solidFill>
-              <a:schemeClr val="bg1"/>
+              <a:schemeClr val="tx1"/>
             </a:solidFill>
             <a:miter lim="800000"/>
             <a:headEnd/>
@@ -39979,9 +39503,6 @@
                 <a:ln>
                   <a:noFill/>
                 </a:ln>
-                <a:solidFill>
-                  <a:schemeClr val="bg1"/>
-                </a:solidFill>
                 <a:effectLst/>
                 <a:uLnTx/>
                 <a:uFillTx/>
@@ -39995,9 +39516,6 @@
                 <a:ln>
                   <a:noFill/>
                 </a:ln>
-                <a:solidFill>
-                  <a:schemeClr val="bg1"/>
-                </a:solidFill>
                 <a:effectLst/>
                 <a:uLnTx/>
                 <a:uFillTx/>
@@ -40011,9 +39529,6 @@
                 <a:ln>
                   <a:noFill/>
                 </a:ln>
-                <a:solidFill>
-                  <a:schemeClr val="bg1"/>
-                </a:solidFill>
                 <a:effectLst/>
                 <a:uLnTx/>
                 <a:uFillTx/>
@@ -40023,9 +39538,6 @@
             </a:br>
             <a:r>
               <a:rPr lang="de-DE" sz="700" b="1" kern="0" dirty="0" err="1">
-                <a:solidFill>
-                  <a:schemeClr val="bg1"/>
-                </a:solidFill>
                 <a:ea typeface="Arial Unicode MS" pitchFamily="34" charset="-128"/>
                 <a:cs typeface="Arial Unicode MS" pitchFamily="34" charset="-128"/>
               </a:rPr>
@@ -40035,9 +39547,6 @@
               <a:ln>
                 <a:noFill/>
               </a:ln>
-              <a:solidFill>
-                <a:schemeClr val="bg1"/>
-              </a:solidFill>
               <a:effectLst/>
               <a:uLnTx/>
               <a:uFillTx/>
@@ -40771,7 +40280,7 @@
     <p:bldLst>
       <p:bldP spid="58" grpId="0" animBg="1"/>
       <p:bldP spid="59" grpId="0" animBg="1"/>
-      <p:bldP spid="61" grpId="0"/>
+      <p:bldP spid="61" grpId="0" animBg="1"/>
       <p:bldP spid="70" grpId="0" animBg="1"/>
       <p:bldP spid="71" grpId="0" animBg="1"/>
       <p:bldP spid="74" grpId="0"/>
@@ -41035,13 +40544,11 @@
             <a:avLst/>
           </a:prstGeom>
           <a:solidFill>
-            <a:schemeClr val="tx1">
-              <a:lumMod val="75000"/>
-            </a:schemeClr>
+            <a:schemeClr val="tx2"/>
           </a:solidFill>
           <a:ln>
             <a:solidFill>
-              <a:schemeClr val="bg1"/>
+              <a:schemeClr val="tx1"/>
             </a:solidFill>
             <a:headEnd/>
             <a:tailEnd/>
@@ -41170,9 +40677,7 @@
             <a:avLst/>
           </a:prstGeom>
           <a:solidFill>
-            <a:schemeClr val="tx1">
-              <a:lumMod val="75000"/>
-            </a:schemeClr>
+            <a:schemeClr val="bg1"/>
           </a:solidFill>
           <a:ln>
             <a:solidFill>
@@ -41381,7 +40886,7 @@
           </a:solidFill>
           <a:ln w="9525" algn="ctr">
             <a:solidFill>
-              <a:schemeClr val="bg1"/>
+              <a:schemeClr val="tx1"/>
             </a:solidFill>
             <a:miter lim="800000"/>
             <a:headEnd/>
@@ -41410,9 +40915,6 @@
             </a:pPr>
             <a:r>
               <a:rPr lang="de-DE" sz="700" b="1" kern="0" dirty="0">
-                <a:solidFill>
-                  <a:schemeClr val="bg1"/>
-                </a:solidFill>
                 <a:ea typeface="Arial Unicode MS" pitchFamily="34" charset="-128"/>
                 <a:cs typeface="Arial Unicode MS" pitchFamily="34" charset="-128"/>
               </a:rPr>
@@ -41423,9 +40925,6 @@
                 <a:ln>
                   <a:noFill/>
                 </a:ln>
-                <a:solidFill>
-                  <a:schemeClr val="bg1"/>
-                </a:solidFill>
                 <a:effectLst/>
                 <a:uLnTx/>
                 <a:uFillTx/>
@@ -41439,9 +40938,6 @@
                 <a:ln>
                   <a:noFill/>
                 </a:ln>
-                <a:solidFill>
-                  <a:schemeClr val="bg1"/>
-                </a:solidFill>
                 <a:effectLst/>
                 <a:uLnTx/>
                 <a:uFillTx/>
@@ -41455,9 +40951,6 @@
                 <a:ln>
                   <a:noFill/>
                 </a:ln>
-                <a:solidFill>
-                  <a:schemeClr val="bg1"/>
-                </a:solidFill>
                 <a:effectLst/>
                 <a:uLnTx/>
                 <a:uFillTx/>
@@ -41470,9 +40963,6 @@
               <a:ln>
                 <a:noFill/>
               </a:ln>
-              <a:solidFill>
-                <a:schemeClr val="bg1"/>
-              </a:solidFill>
               <a:effectLst/>
               <a:uLnTx/>
               <a:uFillTx/>
@@ -41507,7 +40997,7 @@
           </a:solidFill>
           <a:ln w="9525" algn="ctr">
             <a:solidFill>
-              <a:schemeClr val="bg1"/>
+              <a:schemeClr val="tx1"/>
             </a:solidFill>
             <a:miter lim="800000"/>
             <a:headEnd/>
@@ -41539,9 +41029,6 @@
                 <a:ln>
                   <a:noFill/>
                 </a:ln>
-                <a:solidFill>
-                  <a:schemeClr val="bg1"/>
-                </a:solidFill>
                 <a:effectLst/>
                 <a:uLnTx/>
                 <a:uFillTx/>
@@ -41555,9 +41042,6 @@
                 <a:ln>
                   <a:noFill/>
                 </a:ln>
-                <a:solidFill>
-                  <a:schemeClr val="bg1"/>
-                </a:solidFill>
                 <a:effectLst/>
                 <a:uLnTx/>
                 <a:uFillTx/>
@@ -41571,9 +41055,6 @@
                 <a:ln>
                   <a:noFill/>
                 </a:ln>
-                <a:solidFill>
-                  <a:schemeClr val="bg1"/>
-                </a:solidFill>
                 <a:effectLst/>
                 <a:uLnTx/>
                 <a:uFillTx/>
@@ -41586,9 +41067,6 @@
                 <a:ln>
                   <a:noFill/>
                 </a:ln>
-                <a:solidFill>
-                  <a:schemeClr val="bg1"/>
-                </a:solidFill>
                 <a:effectLst/>
                 <a:uLnTx/>
                 <a:uFillTx/>
@@ -41601,9 +41079,6 @@
               <a:ln>
                 <a:noFill/>
               </a:ln>
-              <a:solidFill>
-                <a:schemeClr val="bg1"/>
-              </a:solidFill>
               <a:effectLst/>
               <a:uLnTx/>
               <a:uFillTx/>
@@ -41634,10 +41109,7 @@
             <a:avLst/>
           </a:prstGeom>
           <a:solidFill>
-            <a:schemeClr val="bg1">
-              <a:lumMod val="65000"/>
-              <a:lumOff val="35000"/>
-            </a:schemeClr>
+            <a:schemeClr val="tx2"/>
           </a:solidFill>
           <a:ln>
             <a:solidFill>
@@ -42010,7 +41482,7 @@
           </a:solidFill>
           <a:ln w="9525" algn="ctr">
             <a:solidFill>
-              <a:schemeClr val="bg1"/>
+              <a:schemeClr val="tx1"/>
             </a:solidFill>
             <a:miter lim="800000"/>
             <a:headEnd/>
@@ -42039,9 +41511,6 @@
             </a:pPr>
             <a:r>
               <a:rPr lang="de-DE" sz="700" b="1" kern="0" dirty="0">
-                <a:solidFill>
-                  <a:schemeClr val="bg1"/>
-                </a:solidFill>
                 <a:ea typeface="Arial Unicode MS" pitchFamily="34" charset="-128"/>
                 <a:cs typeface="Arial Unicode MS" pitchFamily="34" charset="-128"/>
               </a:rPr>
@@ -42052,9 +41521,6 @@
                 <a:ln>
                   <a:noFill/>
                 </a:ln>
-                <a:solidFill>
-                  <a:schemeClr val="bg1"/>
-                </a:solidFill>
                 <a:effectLst/>
                 <a:uLnTx/>
                 <a:uFillTx/>
@@ -42068,9 +41534,6 @@
                 <a:ln>
                   <a:noFill/>
                 </a:ln>
-                <a:solidFill>
-                  <a:schemeClr val="bg1"/>
-                </a:solidFill>
                 <a:effectLst/>
                 <a:uLnTx/>
                 <a:uFillTx/>
@@ -42084,9 +41547,6 @@
                 <a:ln>
                   <a:noFill/>
                 </a:ln>
-                <a:solidFill>
-                  <a:schemeClr val="bg1"/>
-                </a:solidFill>
                 <a:effectLst/>
                 <a:uLnTx/>
                 <a:uFillTx/>
@@ -42099,9 +41559,6 @@
               <a:ln>
                 <a:noFill/>
               </a:ln>
-              <a:solidFill>
-                <a:schemeClr val="bg1"/>
-              </a:solidFill>
               <a:effectLst/>
               <a:uLnTx/>
               <a:uFillTx/>
@@ -42136,7 +41593,7 @@
           </a:solidFill>
           <a:ln w="9525" algn="ctr">
             <a:solidFill>
-              <a:schemeClr val="bg1"/>
+              <a:schemeClr val="tx1"/>
             </a:solidFill>
             <a:miter lim="800000"/>
             <a:headEnd/>
@@ -42168,9 +41625,6 @@
                 <a:ln>
                   <a:noFill/>
                 </a:ln>
-                <a:solidFill>
-                  <a:schemeClr val="bg1"/>
-                </a:solidFill>
                 <a:effectLst/>
                 <a:uLnTx/>
                 <a:uFillTx/>
@@ -42184,9 +41638,6 @@
                 <a:ln>
                   <a:noFill/>
                 </a:ln>
-                <a:solidFill>
-                  <a:schemeClr val="bg1"/>
-                </a:solidFill>
                 <a:effectLst/>
                 <a:uLnTx/>
                 <a:uFillTx/>
@@ -42200,9 +41651,6 @@
                 <a:ln>
                   <a:noFill/>
                 </a:ln>
-                <a:solidFill>
-                  <a:schemeClr val="bg1"/>
-                </a:solidFill>
                 <a:effectLst/>
                 <a:uLnTx/>
                 <a:uFillTx/>
@@ -42212,9 +41660,6 @@
             </a:br>
             <a:r>
               <a:rPr lang="de-DE" sz="700" b="1" kern="0" dirty="0" err="1">
-                <a:solidFill>
-                  <a:schemeClr val="bg1"/>
-                </a:solidFill>
                 <a:ea typeface="Arial Unicode MS" pitchFamily="34" charset="-128"/>
                 <a:cs typeface="Arial Unicode MS" pitchFamily="34" charset="-128"/>
               </a:rPr>
@@ -42224,9 +41669,6 @@
               <a:ln>
                 <a:noFill/>
               </a:ln>
-              <a:solidFill>
-                <a:schemeClr val="bg1"/>
-              </a:solidFill>
               <a:effectLst/>
               <a:uLnTx/>
               <a:uFillTx/>
@@ -42257,13 +41699,11 @@
             <a:avLst/>
           </a:prstGeom>
           <a:solidFill>
-            <a:schemeClr val="tx1">
-              <a:lumMod val="75000"/>
-            </a:schemeClr>
+            <a:schemeClr val="tx2"/>
           </a:solidFill>
           <a:ln>
             <a:solidFill>
-              <a:schemeClr val="bg1"/>
+              <a:schemeClr val="tx1"/>
             </a:solidFill>
             <a:headEnd/>
             <a:tailEnd/>
@@ -42332,9 +41772,7 @@
             <a:avLst/>
           </a:prstGeom>
           <a:solidFill>
-            <a:schemeClr val="tx1">
-              <a:lumMod val="75000"/>
-            </a:schemeClr>
+            <a:schemeClr val="bg1"/>
           </a:solidFill>
           <a:ln>
             <a:solidFill>
@@ -42512,7 +41950,7 @@
           </a:solidFill>
           <a:ln w="9525" algn="ctr">
             <a:solidFill>
-              <a:schemeClr val="bg1"/>
+              <a:schemeClr val="tx1"/>
             </a:solidFill>
             <a:miter lim="800000"/>
             <a:headEnd/>
@@ -42541,9 +41979,6 @@
             </a:pPr>
             <a:r>
               <a:rPr lang="de-DE" sz="700" b="1" kern="0" dirty="0">
-                <a:solidFill>
-                  <a:schemeClr val="bg1"/>
-                </a:solidFill>
                 <a:ea typeface="Arial Unicode MS" pitchFamily="34" charset="-128"/>
                 <a:cs typeface="Arial Unicode MS" pitchFamily="34" charset="-128"/>
               </a:rPr>
@@ -42554,9 +41989,6 @@
                 <a:ln>
                   <a:noFill/>
                 </a:ln>
-                <a:solidFill>
-                  <a:schemeClr val="bg1"/>
-                </a:solidFill>
                 <a:effectLst/>
                 <a:uLnTx/>
                 <a:uFillTx/>
@@ -42570,9 +42002,6 @@
                 <a:ln>
                   <a:noFill/>
                 </a:ln>
-                <a:solidFill>
-                  <a:schemeClr val="bg1"/>
-                </a:solidFill>
                 <a:effectLst/>
                 <a:uLnTx/>
                 <a:uFillTx/>
@@ -42583,9 +42012,6 @@
             </a:r>
             <a:r>
               <a:rPr lang="de-DE" sz="700" b="1" kern="0" dirty="0">
-                <a:solidFill>
-                  <a:schemeClr val="bg1"/>
-                </a:solidFill>
                 <a:ea typeface="Arial Unicode MS" pitchFamily="34" charset="-128"/>
                 <a:cs typeface="Arial Unicode MS" pitchFamily="34" charset="-128"/>
               </a:rPr>
@@ -42593,9 +42019,6 @@
             </a:r>
             <a:r>
               <a:rPr lang="de-DE" sz="700" b="1" kern="0" dirty="0" err="1">
-                <a:solidFill>
-                  <a:schemeClr val="bg1"/>
-                </a:solidFill>
                 <a:ea typeface="Arial Unicode MS" pitchFamily="34" charset="-128"/>
                 <a:cs typeface="Arial Unicode MS" pitchFamily="34" charset="-128"/>
               </a:rPr>
@@ -42605,9 +42028,6 @@
               <a:ln>
                 <a:noFill/>
               </a:ln>
-              <a:solidFill>
-                <a:schemeClr val="bg1"/>
-              </a:solidFill>
               <a:effectLst/>
               <a:uLnTx/>
               <a:uFillTx/>
@@ -42638,13 +42058,11 @@
             <a:avLst/>
           </a:prstGeom>
           <a:solidFill>
-            <a:schemeClr val="tx1">
-              <a:lumMod val="75000"/>
-            </a:schemeClr>
+            <a:schemeClr val="tx2"/>
           </a:solidFill>
           <a:ln>
             <a:solidFill>
-              <a:schemeClr val="bg1"/>
+              <a:schemeClr val="tx1"/>
             </a:solidFill>
             <a:headEnd/>
             <a:tailEnd/>
@@ -42713,9 +42131,7 @@
             <a:avLst/>
           </a:prstGeom>
           <a:solidFill>
-            <a:schemeClr val="tx1">
-              <a:lumMod val="75000"/>
-            </a:schemeClr>
+            <a:schemeClr val="bg1"/>
           </a:solidFill>
           <a:ln>
             <a:solidFill>
@@ -42845,7 +42261,7 @@
           </a:solidFill>
           <a:ln w="9525" algn="ctr">
             <a:solidFill>
-              <a:schemeClr val="bg1"/>
+              <a:schemeClr val="tx1"/>
             </a:solidFill>
             <a:miter lim="800000"/>
             <a:headEnd/>
@@ -42874,9 +42290,6 @@
             </a:pPr>
             <a:r>
               <a:rPr lang="de-DE" sz="700" b="1" kern="0" dirty="0" err="1">
-                <a:solidFill>
-                  <a:schemeClr val="bg1"/>
-                </a:solidFill>
                 <a:ea typeface="Arial Unicode MS" pitchFamily="34" charset="-128"/>
                 <a:cs typeface="Arial Unicode MS" pitchFamily="34" charset="-128"/>
               </a:rPr>
@@ -42884,9 +42297,6 @@
             </a:r>
             <a:r>
               <a:rPr lang="de-DE" sz="700" b="1" kern="0" dirty="0">
-                <a:solidFill>
-                  <a:schemeClr val="bg1"/>
-                </a:solidFill>
                 <a:ea typeface="Arial Unicode MS" pitchFamily="34" charset="-128"/>
                 <a:cs typeface="Arial Unicode MS" pitchFamily="34" charset="-128"/>
               </a:rPr>
@@ -42897,9 +42307,6 @@
                 <a:ln>
                   <a:noFill/>
                 </a:ln>
-                <a:solidFill>
-                  <a:schemeClr val="bg1"/>
-                </a:solidFill>
                 <a:effectLst/>
                 <a:uLnTx/>
                 <a:uFillTx/>
@@ -42913,9 +42320,6 @@
                 <a:ln>
                   <a:noFill/>
                 </a:ln>
-                <a:solidFill>
-                  <a:schemeClr val="bg1"/>
-                </a:solidFill>
                 <a:effectLst/>
                 <a:uLnTx/>
                 <a:uFillTx/>
@@ -42929,9 +42333,6 @@
                 <a:ln>
                   <a:noFill/>
                 </a:ln>
-                <a:solidFill>
-                  <a:schemeClr val="bg1"/>
-                </a:solidFill>
                 <a:effectLst/>
                 <a:uLnTx/>
                 <a:uFillTx/>
@@ -42968,7 +42369,7 @@
           </a:solidFill>
           <a:ln w="9525" algn="ctr">
             <a:solidFill>
-              <a:schemeClr val="bg1"/>
+              <a:schemeClr val="tx1"/>
             </a:solidFill>
             <a:miter lim="800000"/>
             <a:headEnd/>
@@ -42997,9 +42398,6 @@
             </a:pPr>
             <a:r>
               <a:rPr lang="de-DE" sz="700" b="1" kern="0" dirty="0" err="1">
-                <a:solidFill>
-                  <a:schemeClr val="bg1"/>
-                </a:solidFill>
                 <a:ea typeface="Arial Unicode MS" pitchFamily="34" charset="-128"/>
                 <a:cs typeface="Arial Unicode MS" pitchFamily="34" charset="-128"/>
               </a:rPr>
@@ -43007,9 +42405,6 @@
             </a:r>
             <a:r>
               <a:rPr lang="de-DE" sz="700" b="1" kern="0" dirty="0">
-                <a:solidFill>
-                  <a:schemeClr val="bg1"/>
-                </a:solidFill>
                 <a:ea typeface="Arial Unicode MS" pitchFamily="34" charset="-128"/>
                 <a:cs typeface="Arial Unicode MS" pitchFamily="34" charset="-128"/>
               </a:rPr>
@@ -43017,9 +42412,6 @@
             </a:r>
             <a:r>
               <a:rPr lang="de-DE" sz="700" b="1" kern="0" dirty="0" err="1">
-                <a:solidFill>
-                  <a:schemeClr val="bg1"/>
-                </a:solidFill>
                 <a:ea typeface="Arial Unicode MS" pitchFamily="34" charset="-128"/>
                 <a:cs typeface="Arial Unicode MS" pitchFamily="34" charset="-128"/>
               </a:rPr>
@@ -43027,9 +42419,6 @@
             </a:r>
             <a:r>
               <a:rPr lang="de-DE" sz="700" b="1" kern="0" dirty="0">
-                <a:solidFill>
-                  <a:schemeClr val="bg1"/>
-                </a:solidFill>
                 <a:ea typeface="Arial Unicode MS" pitchFamily="34" charset="-128"/>
                 <a:cs typeface="Arial Unicode MS" pitchFamily="34" charset="-128"/>
               </a:rPr>
@@ -43039,9 +42428,6 @@
               <a:ln>
                 <a:noFill/>
               </a:ln>
-              <a:solidFill>
-                <a:schemeClr val="bg1"/>
-              </a:solidFill>
               <a:effectLst/>
               <a:uLnTx/>
               <a:uFillTx/>
@@ -43182,7 +42568,7 @@
           </a:solidFill>
           <a:ln w="9525" algn="ctr">
             <a:solidFill>
-              <a:schemeClr val="bg1"/>
+              <a:schemeClr val="tx1"/>
             </a:solidFill>
             <a:miter lim="800000"/>
             <a:headEnd/>
@@ -43214,9 +42600,6 @@
                 <a:ln>
                   <a:noFill/>
                 </a:ln>
-                <a:solidFill>
-                  <a:schemeClr val="bg1"/>
-                </a:solidFill>
                 <a:effectLst/>
                 <a:uLnTx/>
                 <a:uFillTx/>
@@ -43230,9 +42613,6 @@
                 <a:ln>
                   <a:noFill/>
                 </a:ln>
-                <a:solidFill>
-                  <a:schemeClr val="bg1"/>
-                </a:solidFill>
                 <a:effectLst/>
                 <a:uLnTx/>
                 <a:uFillTx/>
@@ -43246,9 +42626,6 @@
                 <a:ln>
                   <a:noFill/>
                 </a:ln>
-                <a:solidFill>
-                  <a:schemeClr val="bg1"/>
-                </a:solidFill>
                 <a:effectLst/>
                 <a:uLnTx/>
                 <a:uFillTx/>
@@ -43261,9 +42638,6 @@
               <a:ln>
                 <a:noFill/>
               </a:ln>
-              <a:solidFill>
-                <a:schemeClr val="bg1"/>
-              </a:solidFill>
               <a:effectLst/>
               <a:uLnTx/>
               <a:uFillTx/>
@@ -43298,7 +42672,7 @@
           </a:solidFill>
           <a:ln w="9525" algn="ctr">
             <a:solidFill>
-              <a:schemeClr val="bg1"/>
+              <a:schemeClr val="tx1"/>
             </a:solidFill>
             <a:miter lim="800000"/>
             <a:headEnd/>
@@ -43327,9 +42701,6 @@
             </a:pPr>
             <a:r>
               <a:rPr lang="de-DE" sz="700" b="1" kern="0" dirty="0" err="1">
-                <a:solidFill>
-                  <a:schemeClr val="bg1"/>
-                </a:solidFill>
                 <a:ea typeface="Arial Unicode MS" pitchFamily="34" charset="-128"/>
                 <a:cs typeface="Arial Unicode MS" pitchFamily="34" charset="-128"/>
               </a:rPr>
@@ -43337,9 +42708,6 @@
             </a:r>
             <a:r>
               <a:rPr lang="de-DE" sz="700" b="1" kern="0" dirty="0">
-                <a:solidFill>
-                  <a:schemeClr val="bg1"/>
-                </a:solidFill>
                 <a:ea typeface="Arial Unicode MS" pitchFamily="34" charset="-128"/>
                 <a:cs typeface="Arial Unicode MS" pitchFamily="34" charset="-128"/>
               </a:rPr>
@@ -43347,9 +42715,6 @@
             </a:r>
             <a:r>
               <a:rPr lang="de-DE" sz="700" b="1" kern="0" dirty="0" err="1">
-                <a:solidFill>
-                  <a:schemeClr val="bg1"/>
-                </a:solidFill>
                 <a:ea typeface="Arial Unicode MS" pitchFamily="34" charset="-128"/>
                 <a:cs typeface="Arial Unicode MS" pitchFamily="34" charset="-128"/>
               </a:rPr>
@@ -43359,9 +42724,6 @@
               <a:ln>
                 <a:noFill/>
               </a:ln>
-              <a:solidFill>
-                <a:schemeClr val="bg1"/>
-              </a:solidFill>
               <a:effectLst/>
               <a:uLnTx/>
               <a:uFillTx/>
@@ -43583,9 +42945,6 @@
             </a:pPr>
             <a:r>
               <a:rPr lang="en-US" sz="2000" kern="0" dirty="0">
-                <a:solidFill>
-                  <a:schemeClr val="bg1"/>
-                </a:solidFill>
                 <a:ea typeface="Arial Unicode MS" pitchFamily="34" charset="-128"/>
                 <a:cs typeface="Arial Unicode MS" pitchFamily="34" charset="-128"/>
               </a:rPr>
@@ -43593,18 +42952,12 @@
             </a:r>
             <a:br>
               <a:rPr lang="en-US" sz="2000" kern="0" dirty="0">
-                <a:solidFill>
-                  <a:schemeClr val="bg1"/>
-                </a:solidFill>
                 <a:ea typeface="Arial Unicode MS" pitchFamily="34" charset="-128"/>
                 <a:cs typeface="Arial Unicode MS" pitchFamily="34" charset="-128"/>
               </a:rPr>
             </a:br>
             <a:r>
               <a:rPr lang="en-US" sz="2000" kern="0" dirty="0" err="1">
-                <a:solidFill>
-                  <a:schemeClr val="bg1"/>
-                </a:solidFill>
                 <a:ea typeface="Arial Unicode MS" pitchFamily="34" charset="-128"/>
                 <a:cs typeface="Arial Unicode MS" pitchFamily="34" charset="-128"/>
               </a:rPr>
@@ -43612,9 +42965,6 @@
             </a:r>
             <a:r>
               <a:rPr lang="en-US" sz="2000" kern="0" dirty="0">
-                <a:solidFill>
-                  <a:schemeClr val="bg1"/>
-                </a:solidFill>
                 <a:ea typeface="Arial Unicode MS" pitchFamily="34" charset="-128"/>
                 <a:cs typeface="Arial Unicode MS" pitchFamily="34" charset="-128"/>
               </a:rPr>
@@ -43664,9 +43014,6 @@
             </a:pPr>
             <a:r>
               <a:rPr lang="en-US" sz="2000" kern="0" dirty="0">
-                <a:solidFill>
-                  <a:schemeClr val="bg1"/>
-                </a:solidFill>
                 <a:ea typeface="Arial Unicode MS" pitchFamily="34" charset="-128"/>
                 <a:cs typeface="Arial Unicode MS" pitchFamily="34" charset="-128"/>
               </a:rPr>
@@ -43674,18 +43021,12 @@
             </a:r>
             <a:br>
               <a:rPr lang="en-US" sz="2000" kern="0" dirty="0">
-                <a:solidFill>
-                  <a:schemeClr val="bg1"/>
-                </a:solidFill>
                 <a:ea typeface="Arial Unicode MS" pitchFamily="34" charset="-128"/>
                 <a:cs typeface="Arial Unicode MS" pitchFamily="34" charset="-128"/>
               </a:rPr>
             </a:br>
             <a:r>
               <a:rPr lang="en-US" sz="2000" kern="0" dirty="0">
-                <a:solidFill>
-                  <a:schemeClr val="bg1"/>
-                </a:solidFill>
                 <a:ea typeface="Arial Unicode MS" pitchFamily="34" charset="-128"/>
                 <a:cs typeface="Arial Unicode MS" pitchFamily="34" charset="-128"/>
               </a:rPr>
@@ -44915,7 +44256,7 @@
 </file>
 
 <file path=ppt/slides/slide7.xml><?xml version="1.0" encoding="utf-8"?>
-<p:sld xmlns:a="http://schemas.openxmlformats.org/drawingml/2006/main" xmlns:r="http://schemas.openxmlformats.org/officeDocument/2006/relationships" xmlns:p="http://schemas.openxmlformats.org/presentationml/2006/main">
+<p:sld xmlns:a="http://schemas.openxmlformats.org/drawingml/2006/main" xmlns:r="http://schemas.openxmlformats.org/officeDocument/2006/relationships" xmlns:p="http://schemas.openxmlformats.org/presentationml/2006/main" show="0">
   <p:cSld>
     <p:spTree>
       <p:nvGrpSpPr>
@@ -44931,1129 +44272,12 @@
           <a:chExt cx="0" cy="0"/>
         </a:xfrm>
       </p:grpSpPr>
-      <p:sp>
-        <p:nvSpPr>
-          <p:cNvPr id="4" name="Title 3">
-            <a:extLst>
-              <a:ext uri="{FF2B5EF4-FFF2-40B4-BE49-F238E27FC236}">
-                <a16:creationId xmlns:a16="http://schemas.microsoft.com/office/drawing/2014/main" id="{678A9EDA-D4FB-4F49-B422-E2C2303E5204}"/>
-              </a:ext>
-            </a:extLst>
-          </p:cNvPr>
-          <p:cNvSpPr>
-            <a:spLocks noGrp="1"/>
-          </p:cNvSpPr>
-          <p:nvPr>
-            <p:ph type="ctrTitle"/>
-          </p:nvPr>
-        </p:nvSpPr>
-        <p:spPr/>
-        <p:txBody>
-          <a:bodyPr/>
-          <a:lstStyle/>
-          <a:p>
-            <a:r>
-              <a:rPr lang="de-DE" dirty="0"/>
-              <a:t>Appendix</a:t>
-            </a:r>
-          </a:p>
-        </p:txBody>
-      </p:sp>
     </p:spTree>
-    <p:extLst>
-      <p:ext uri="{BB962C8B-B14F-4D97-AF65-F5344CB8AC3E}">
-        <p14:creationId xmlns:p14="http://schemas.microsoft.com/office/powerpoint/2010/main" val="3997893514"/>
-      </p:ext>
-    </p:extLst>
   </p:cSld>
   <p:clrMapOvr>
     <a:masterClrMapping/>
   </p:clrMapOvr>
-</p:sld>
-</file>
-
-<file path=ppt/slides/slide8.xml><?xml version="1.0" encoding="utf-8"?>
-<p:sld xmlns:a="http://schemas.openxmlformats.org/drawingml/2006/main" xmlns:r="http://schemas.openxmlformats.org/officeDocument/2006/relationships" xmlns:p="http://schemas.openxmlformats.org/presentationml/2006/main">
-  <p:cSld>
-    <p:spTree>
-      <p:nvGrpSpPr>
-        <p:cNvPr id="1" name=""/>
-        <p:cNvGrpSpPr/>
-        <p:nvPr/>
-      </p:nvGrpSpPr>
-      <p:grpSpPr>
-        <a:xfrm>
-          <a:off x="0" y="0"/>
-          <a:ext cx="0" cy="0"/>
-          <a:chOff x="0" y="0"/>
-          <a:chExt cx="0" cy="0"/>
-        </a:xfrm>
-      </p:grpSpPr>
-      <p:sp>
-        <p:nvSpPr>
-          <p:cNvPr id="3" name="Title 2"/>
-          <p:cNvSpPr>
-            <a:spLocks noGrp="1"/>
-          </p:cNvSpPr>
-          <p:nvPr>
-            <p:ph type="title"/>
-          </p:nvPr>
-        </p:nvSpPr>
-        <p:spPr/>
-        <p:txBody>
-          <a:bodyPr/>
-          <a:lstStyle/>
-          <a:p>
-            <a:r>
-              <a:rPr lang="en-US" dirty="0"/>
-              <a:t>What YOU will do in exercise #0x</a:t>
-            </a:r>
-          </a:p>
-        </p:txBody>
-      </p:sp>
-      <p:grpSp>
-        <p:nvGrpSpPr>
-          <p:cNvPr id="13" name="Group 12"/>
-          <p:cNvGrpSpPr/>
-          <p:nvPr/>
-        </p:nvGrpSpPr>
-        <p:grpSpPr>
-          <a:xfrm>
-            <a:off x="2674620" y="2948940"/>
-            <a:ext cx="6187440" cy="1752600"/>
-            <a:chOff x="2697480" y="2743200"/>
-            <a:chExt cx="6187440" cy="2034540"/>
-          </a:xfrm>
-        </p:grpSpPr>
-        <p:sp>
-          <p:nvSpPr>
-            <p:cNvPr id="12" name="Rectangle: Rounded Corners 11"/>
-            <p:cNvSpPr/>
-            <p:nvPr/>
-          </p:nvSpPr>
-          <p:spPr bwMode="gray">
-            <a:xfrm>
-              <a:off x="2697480" y="2743200"/>
-              <a:ext cx="6187440" cy="2034540"/>
-            </a:xfrm>
-            <a:prstGeom prst="roundRect">
-              <a:avLst/>
-            </a:prstGeom>
-            <a:ln>
-              <a:headEnd/>
-              <a:tailEnd/>
-            </a:ln>
-          </p:spPr>
-          <p:style>
-            <a:lnRef idx="2">
-              <a:schemeClr val="accent1"/>
-            </a:lnRef>
-            <a:fillRef idx="1">
-              <a:schemeClr val="lt1"/>
-            </a:fillRef>
-            <a:effectRef idx="0">
-              <a:schemeClr val="accent1"/>
-            </a:effectRef>
-            <a:fontRef idx="minor">
-              <a:schemeClr val="dk1"/>
-            </a:fontRef>
-          </p:style>
-          <p:txBody>
-            <a:bodyPr lIns="90000" tIns="72000" rIns="90000" bIns="72000" rtlCol="0" anchor="ctr"/>
-            <a:lstStyle/>
-            <a:p>
-              <a:pPr marL="0" marR="0" lvl="0" indent="0" algn="ctr" defTabSz="914400" rtl="0" eaLnBrk="1" fontAlgn="base" latinLnBrk="0" hangingPunct="1">
-                <a:lnSpc>
-                  <a:spcPct val="100000"/>
-                </a:lnSpc>
-                <a:spcBef>
-                  <a:spcPct val="50000"/>
-                </a:spcBef>
-                <a:spcAft>
-                  <a:spcPct val="0"/>
-                </a:spcAft>
-                <a:buClr>
-                  <a:srgbClr val="F0AB00"/>
-                </a:buClr>
-                <a:buSzPct val="80000"/>
-                <a:buFontTx/>
-                <a:buNone/>
-                <a:tabLst/>
-                <a:defRPr/>
-              </a:pPr>
-              <a:endParaRPr kumimoji="0" lang="en-US" sz="1800" b="0" i="0" u="none" strike="noStrike" kern="0" cap="none" spc="0" normalizeH="0" baseline="0" noProof="0" dirty="0" err="1">
-                <a:ln>
-                  <a:noFill/>
-                </a:ln>
-                <a:solidFill>
-                  <a:srgbClr val="000000"/>
-                </a:solidFill>
-                <a:effectLst/>
-                <a:uLnTx/>
-                <a:uFillTx/>
-                <a:latin typeface="Arial"/>
-                <a:ea typeface="Arial Unicode MS" pitchFamily="34" charset="-128"/>
-                <a:cs typeface="Arial Unicode MS" pitchFamily="34" charset="-128"/>
-              </a:endParaRPr>
-            </a:p>
-          </p:txBody>
-        </p:sp>
-        <p:sp>
-          <p:nvSpPr>
-            <p:cNvPr id="4" name="Rectangle 3"/>
-            <p:cNvSpPr/>
-            <p:nvPr/>
-          </p:nvSpPr>
-          <p:spPr bwMode="gray">
-            <a:xfrm>
-              <a:off x="2989653" y="3164976"/>
-              <a:ext cx="1627931" cy="1156258"/>
-            </a:xfrm>
-            <a:prstGeom prst="rect">
-              <a:avLst/>
-            </a:prstGeom>
-            <a:solidFill>
-              <a:schemeClr val="accent4"/>
-            </a:solidFill>
-            <a:ln>
-              <a:headEnd/>
-              <a:tailEnd/>
-            </a:ln>
-          </p:spPr>
-          <p:style>
-            <a:lnRef idx="2">
-              <a:schemeClr val="accent2"/>
-            </a:lnRef>
-            <a:fillRef idx="1">
-              <a:schemeClr val="lt1"/>
-            </a:fillRef>
-            <a:effectRef idx="0">
-              <a:schemeClr val="accent2"/>
-            </a:effectRef>
-            <a:fontRef idx="minor">
-              <a:schemeClr val="dk1"/>
-            </a:fontRef>
-          </p:style>
-          <p:txBody>
-            <a:bodyPr lIns="90000" tIns="72000" rIns="90000" bIns="72000" rtlCol="0" anchor="ctr"/>
-            <a:lstStyle/>
-            <a:p>
-              <a:pPr marL="0" marR="0" lvl="0" indent="0" algn="ctr" defTabSz="914400" rtl="0" eaLnBrk="1" fontAlgn="base" latinLnBrk="0" hangingPunct="1">
-                <a:lnSpc>
-                  <a:spcPct val="100000"/>
-                </a:lnSpc>
-                <a:spcBef>
-                  <a:spcPct val="50000"/>
-                </a:spcBef>
-                <a:spcAft>
-                  <a:spcPct val="0"/>
-                </a:spcAft>
-                <a:buClr>
-                  <a:srgbClr val="F0AB00"/>
-                </a:buClr>
-                <a:buSzPct val="80000"/>
-                <a:buFontTx/>
-                <a:buNone/>
-                <a:tabLst/>
-                <a:defRPr/>
-              </a:pPr>
-              <a:r>
-                <a:rPr kumimoji="0" lang="de-DE" sz="1800" b="0" i="0" u="none" strike="noStrike" kern="0" cap="none" spc="0" normalizeH="0" baseline="0" noProof="0" dirty="0" err="1">
-                  <a:ln>
-                    <a:noFill/>
-                  </a:ln>
-                  <a:solidFill>
-                    <a:srgbClr val="000000"/>
-                  </a:solidFill>
-                  <a:effectLst/>
-                  <a:uLnTx/>
-                  <a:uFillTx/>
-                  <a:latin typeface="Arial"/>
-                  <a:ea typeface="Arial Unicode MS" pitchFamily="34" charset="-128"/>
-                  <a:cs typeface="Arial Unicode MS" pitchFamily="34" charset="-128"/>
-                </a:rPr>
-                <a:t>nginx</a:t>
-              </a:r>
-              <a:endParaRPr kumimoji="0" lang="de-DE" sz="1800" b="0" i="0" u="none" strike="noStrike" kern="0" cap="none" spc="0" normalizeH="0" baseline="0" noProof="0" dirty="0">
-                <a:ln>
-                  <a:noFill/>
-                </a:ln>
-                <a:solidFill>
-                  <a:srgbClr val="000000"/>
-                </a:solidFill>
-                <a:effectLst/>
-                <a:uLnTx/>
-                <a:uFillTx/>
-                <a:latin typeface="Arial"/>
-                <a:ea typeface="Arial Unicode MS" pitchFamily="34" charset="-128"/>
-                <a:cs typeface="Arial Unicode MS" pitchFamily="34" charset="-128"/>
-              </a:endParaRPr>
-            </a:p>
-          </p:txBody>
-        </p:sp>
-        <p:sp>
-          <p:nvSpPr>
-            <p:cNvPr id="6" name="Rectangle 5"/>
-            <p:cNvSpPr/>
-            <p:nvPr/>
-          </p:nvSpPr>
-          <p:spPr bwMode="gray">
-            <a:xfrm>
-              <a:off x="6855115" y="3164976"/>
-              <a:ext cx="1627931" cy="1156258"/>
-            </a:xfrm>
-            <a:prstGeom prst="rect">
-              <a:avLst/>
-            </a:prstGeom>
-            <a:solidFill>
-              <a:schemeClr val="bg2"/>
-            </a:solidFill>
-            <a:ln>
-              <a:headEnd/>
-              <a:tailEnd/>
-            </a:ln>
-          </p:spPr>
-          <p:style>
-            <a:lnRef idx="2">
-              <a:schemeClr val="accent2"/>
-            </a:lnRef>
-            <a:fillRef idx="1">
-              <a:schemeClr val="lt1"/>
-            </a:fillRef>
-            <a:effectRef idx="0">
-              <a:schemeClr val="accent2"/>
-            </a:effectRef>
-            <a:fontRef idx="minor">
-              <a:schemeClr val="dk1"/>
-            </a:fontRef>
-          </p:style>
-          <p:txBody>
-            <a:bodyPr lIns="90000" tIns="72000" rIns="90000" bIns="72000" rtlCol="0" anchor="ctr"/>
-            <a:lstStyle/>
-            <a:p>
-              <a:pPr marL="0" marR="0" lvl="0" indent="0" algn="ctr" defTabSz="914400" rtl="0" eaLnBrk="1" fontAlgn="base" latinLnBrk="0" hangingPunct="1">
-                <a:lnSpc>
-                  <a:spcPct val="100000"/>
-                </a:lnSpc>
-                <a:spcBef>
-                  <a:spcPct val="50000"/>
-                </a:spcBef>
-                <a:spcAft>
-                  <a:spcPct val="0"/>
-                </a:spcAft>
-                <a:buClr>
-                  <a:srgbClr val="F0AB00"/>
-                </a:buClr>
-                <a:buSzPct val="80000"/>
-                <a:buFontTx/>
-                <a:buNone/>
-                <a:tabLst/>
-                <a:defRPr/>
-              </a:pPr>
-              <a:r>
-                <a:rPr kumimoji="0" lang="de-DE" sz="1800" b="0" i="0" u="none" strike="noStrike" kern="0" cap="none" spc="0" normalizeH="0" baseline="0" noProof="0" dirty="0" err="1">
-                  <a:ln>
-                    <a:noFill/>
-                  </a:ln>
-                  <a:solidFill>
-                    <a:srgbClr val="000000"/>
-                  </a:solidFill>
-                  <a:effectLst/>
-                  <a:uLnTx/>
-                  <a:uFillTx/>
-                  <a:latin typeface="Arial"/>
-                  <a:ea typeface="Arial Unicode MS" pitchFamily="34" charset="-128"/>
-                  <a:cs typeface="Arial Unicode MS" pitchFamily="34" charset="-128"/>
-                </a:rPr>
-                <a:t>nginx</a:t>
-              </a:r>
-              <a:endParaRPr kumimoji="0" lang="de-DE" sz="1800" b="0" i="0" u="none" strike="noStrike" kern="0" cap="none" spc="0" normalizeH="0" baseline="0" noProof="0" dirty="0">
-                <a:ln>
-                  <a:noFill/>
-                </a:ln>
-                <a:solidFill>
-                  <a:srgbClr val="000000"/>
-                </a:solidFill>
-                <a:effectLst/>
-                <a:uLnTx/>
-                <a:uFillTx/>
-                <a:latin typeface="Arial"/>
-                <a:ea typeface="Arial Unicode MS" pitchFamily="34" charset="-128"/>
-                <a:cs typeface="Arial Unicode MS" pitchFamily="34" charset="-128"/>
-              </a:endParaRPr>
-            </a:p>
-          </p:txBody>
-        </p:sp>
-        <p:sp>
-          <p:nvSpPr>
-            <p:cNvPr id="7" name="Rectangle 6"/>
-            <p:cNvSpPr/>
-            <p:nvPr/>
-          </p:nvSpPr>
-          <p:spPr bwMode="gray">
-            <a:xfrm>
-              <a:off x="4922384" y="3164976"/>
-              <a:ext cx="1627931" cy="1156258"/>
-            </a:xfrm>
-            <a:prstGeom prst="rect">
-              <a:avLst/>
-            </a:prstGeom>
-            <a:solidFill>
-              <a:schemeClr val="bg2"/>
-            </a:solidFill>
-            <a:ln>
-              <a:headEnd/>
-              <a:tailEnd/>
-            </a:ln>
-          </p:spPr>
-          <p:style>
-            <a:lnRef idx="2">
-              <a:schemeClr val="accent2"/>
-            </a:lnRef>
-            <a:fillRef idx="1">
-              <a:schemeClr val="lt1"/>
-            </a:fillRef>
-            <a:effectRef idx="0">
-              <a:schemeClr val="accent2"/>
-            </a:effectRef>
-            <a:fontRef idx="minor">
-              <a:schemeClr val="dk1"/>
-            </a:fontRef>
-          </p:style>
-          <p:txBody>
-            <a:bodyPr lIns="90000" tIns="72000" rIns="90000" bIns="72000" rtlCol="0" anchor="ctr"/>
-            <a:lstStyle/>
-            <a:p>
-              <a:pPr marL="0" marR="0" lvl="0" indent="0" algn="ctr" defTabSz="914400" rtl="0" eaLnBrk="1" fontAlgn="base" latinLnBrk="0" hangingPunct="1">
-                <a:lnSpc>
-                  <a:spcPct val="100000"/>
-                </a:lnSpc>
-                <a:spcBef>
-                  <a:spcPct val="50000"/>
-                </a:spcBef>
-                <a:spcAft>
-                  <a:spcPct val="0"/>
-                </a:spcAft>
-                <a:buClr>
-                  <a:srgbClr val="F0AB00"/>
-                </a:buClr>
-                <a:buSzPct val="80000"/>
-                <a:buFontTx/>
-                <a:buNone/>
-                <a:tabLst/>
-                <a:defRPr/>
-              </a:pPr>
-              <a:r>
-                <a:rPr kumimoji="0" lang="de-DE" sz="1800" b="0" i="0" u="none" strike="noStrike" kern="0" cap="none" spc="0" normalizeH="0" baseline="0" noProof="0" dirty="0" err="1">
-                  <a:ln>
-                    <a:noFill/>
-                  </a:ln>
-                  <a:solidFill>
-                    <a:srgbClr val="000000"/>
-                  </a:solidFill>
-                  <a:effectLst/>
-                  <a:uLnTx/>
-                  <a:uFillTx/>
-                  <a:latin typeface="Arial"/>
-                  <a:ea typeface="Arial Unicode MS" pitchFamily="34" charset="-128"/>
-                  <a:cs typeface="Arial Unicode MS" pitchFamily="34" charset="-128"/>
-                </a:rPr>
-                <a:t>nginx</a:t>
-              </a:r>
-              <a:endParaRPr kumimoji="0" lang="de-DE" sz="1800" b="0" i="0" u="none" strike="noStrike" kern="0" cap="none" spc="0" normalizeH="0" baseline="0" noProof="0" dirty="0">
-                <a:ln>
-                  <a:noFill/>
-                </a:ln>
-                <a:solidFill>
-                  <a:srgbClr val="000000"/>
-                </a:solidFill>
-                <a:effectLst/>
-                <a:uLnTx/>
-                <a:uFillTx/>
-                <a:latin typeface="Arial"/>
-                <a:ea typeface="Arial Unicode MS" pitchFamily="34" charset="-128"/>
-                <a:cs typeface="Arial Unicode MS" pitchFamily="34" charset="-128"/>
-              </a:endParaRPr>
-            </a:p>
-          </p:txBody>
-        </p:sp>
-      </p:grpSp>
-      <p:grpSp>
-        <p:nvGrpSpPr>
-          <p:cNvPr id="15" name="Group 14"/>
-          <p:cNvGrpSpPr/>
-          <p:nvPr/>
-        </p:nvGrpSpPr>
-        <p:grpSpPr>
-          <a:xfrm>
-            <a:off x="3482340" y="5176656"/>
-            <a:ext cx="4572000" cy="1363980"/>
-            <a:chOff x="3421380" y="5067300"/>
-            <a:chExt cx="4572000" cy="1363980"/>
-          </a:xfrm>
-        </p:grpSpPr>
-        <p:sp>
-          <p:nvSpPr>
-            <p:cNvPr id="14" name="Rectangle: Rounded Corners 13"/>
-            <p:cNvSpPr/>
-            <p:nvPr/>
-          </p:nvSpPr>
-          <p:spPr bwMode="gray">
-            <a:xfrm>
-              <a:off x="3421380" y="5067300"/>
-              <a:ext cx="4572000" cy="1363980"/>
-            </a:xfrm>
-            <a:prstGeom prst="roundRect">
-              <a:avLst/>
-            </a:prstGeom>
-            <a:ln>
-              <a:headEnd/>
-              <a:tailEnd/>
-            </a:ln>
-          </p:spPr>
-          <p:style>
-            <a:lnRef idx="2">
-              <a:schemeClr val="accent1"/>
-            </a:lnRef>
-            <a:fillRef idx="1">
-              <a:schemeClr val="lt1"/>
-            </a:fillRef>
-            <a:effectRef idx="0">
-              <a:schemeClr val="accent1"/>
-            </a:effectRef>
-            <a:fontRef idx="minor">
-              <a:schemeClr val="dk1"/>
-            </a:fontRef>
-          </p:style>
-          <p:txBody>
-            <a:bodyPr lIns="90000" tIns="72000" rIns="90000" bIns="72000" rtlCol="0" anchor="ctr"/>
-            <a:lstStyle/>
-            <a:p>
-              <a:pPr marL="0" marR="0" lvl="0" indent="0" algn="ctr" defTabSz="914400" rtl="0" eaLnBrk="1" fontAlgn="base" latinLnBrk="0" hangingPunct="1">
-                <a:lnSpc>
-                  <a:spcPct val="100000"/>
-                </a:lnSpc>
-                <a:spcBef>
-                  <a:spcPct val="50000"/>
-                </a:spcBef>
-                <a:spcAft>
-                  <a:spcPct val="0"/>
-                </a:spcAft>
-                <a:buClr>
-                  <a:srgbClr val="F0AB00"/>
-                </a:buClr>
-                <a:buSzPct val="80000"/>
-                <a:buFontTx/>
-                <a:buNone/>
-                <a:tabLst/>
-                <a:defRPr/>
-              </a:pPr>
-              <a:endParaRPr kumimoji="0" lang="en-US" sz="1800" b="0" i="0" u="none" strike="noStrike" kern="0" cap="none" spc="0" normalizeH="0" baseline="0" noProof="0" dirty="0" err="1">
-                <a:ln>
-                  <a:noFill/>
-                </a:ln>
-                <a:solidFill>
-                  <a:srgbClr val="000000"/>
-                </a:solidFill>
-                <a:effectLst/>
-                <a:uLnTx/>
-                <a:uFillTx/>
-                <a:latin typeface="Arial"/>
-                <a:ea typeface="Arial Unicode MS" pitchFamily="34" charset="-128"/>
-                <a:cs typeface="Arial Unicode MS" pitchFamily="34" charset="-128"/>
-              </a:endParaRPr>
-            </a:p>
-          </p:txBody>
-        </p:sp>
-        <p:sp>
-          <p:nvSpPr>
-            <p:cNvPr id="8" name="Cylinder 7"/>
-            <p:cNvSpPr/>
-            <p:nvPr/>
-          </p:nvSpPr>
-          <p:spPr bwMode="gray">
-            <a:xfrm>
-              <a:off x="3946888" y="5248563"/>
-              <a:ext cx="998220" cy="1004248"/>
-            </a:xfrm>
-            <a:prstGeom prst="can">
-              <a:avLst/>
-            </a:prstGeom>
-            <a:ln>
-              <a:headEnd/>
-              <a:tailEnd/>
-            </a:ln>
-          </p:spPr>
-          <p:style>
-            <a:lnRef idx="2">
-              <a:schemeClr val="accent2"/>
-            </a:lnRef>
-            <a:fillRef idx="1">
-              <a:schemeClr val="lt1"/>
-            </a:fillRef>
-            <a:effectRef idx="0">
-              <a:schemeClr val="accent2"/>
-            </a:effectRef>
-            <a:fontRef idx="minor">
-              <a:schemeClr val="dk1"/>
-            </a:fontRef>
-          </p:style>
-          <p:txBody>
-            <a:bodyPr lIns="90000" tIns="72000" rIns="90000" bIns="72000" rtlCol="0" anchor="ctr"/>
-            <a:lstStyle/>
-            <a:p>
-              <a:pPr marL="0" marR="0" lvl="0" indent="0" algn="ctr" defTabSz="914400" rtl="0" eaLnBrk="1" fontAlgn="base" latinLnBrk="0" hangingPunct="1">
-                <a:lnSpc>
-                  <a:spcPct val="100000"/>
-                </a:lnSpc>
-                <a:spcBef>
-                  <a:spcPct val="50000"/>
-                </a:spcBef>
-                <a:spcAft>
-                  <a:spcPct val="0"/>
-                </a:spcAft>
-                <a:buClr>
-                  <a:srgbClr val="F0AB00"/>
-                </a:buClr>
-                <a:buSzPct val="80000"/>
-                <a:buFontTx/>
-                <a:buNone/>
-                <a:tabLst/>
-                <a:defRPr/>
-              </a:pPr>
-              <a:r>
-                <a:rPr kumimoji="0" lang="de-DE" sz="1800" b="0" i="0" u="none" strike="noStrike" kern="0" cap="none" spc="0" normalizeH="0" baseline="0" noProof="0" dirty="0" err="1">
-                  <a:ln>
-                    <a:noFill/>
-                  </a:ln>
-                  <a:solidFill>
-                    <a:srgbClr val="000000"/>
-                  </a:solidFill>
-                  <a:effectLst/>
-                  <a:uLnTx/>
-                  <a:uFillTx/>
-                  <a:latin typeface="Arial"/>
-                  <a:ea typeface="Arial Unicode MS" pitchFamily="34" charset="-128"/>
-                  <a:cs typeface="Arial Unicode MS" pitchFamily="34" charset="-128"/>
-                </a:rPr>
-                <a:t>content</a:t>
-              </a:r>
-              <a:endParaRPr kumimoji="0" lang="de-DE" sz="1800" b="0" i="0" u="none" strike="noStrike" kern="0" cap="none" spc="0" normalizeH="0" baseline="0" noProof="0" dirty="0">
-                <a:ln>
-                  <a:noFill/>
-                </a:ln>
-                <a:solidFill>
-                  <a:srgbClr val="000000"/>
-                </a:solidFill>
-                <a:effectLst/>
-                <a:uLnTx/>
-                <a:uFillTx/>
-                <a:latin typeface="Arial"/>
-                <a:ea typeface="Arial Unicode MS" pitchFamily="34" charset="-128"/>
-                <a:cs typeface="Arial Unicode MS" pitchFamily="34" charset="-128"/>
-              </a:endParaRPr>
-            </a:p>
-          </p:txBody>
-        </p:sp>
-        <p:sp>
-          <p:nvSpPr>
-            <p:cNvPr id="9" name="Cylinder 8"/>
-            <p:cNvSpPr/>
-            <p:nvPr/>
-          </p:nvSpPr>
-          <p:spPr bwMode="gray">
-            <a:xfrm>
-              <a:off x="5214379" y="5248563"/>
-              <a:ext cx="998220" cy="1004248"/>
-            </a:xfrm>
-            <a:prstGeom prst="can">
-              <a:avLst/>
-            </a:prstGeom>
-            <a:ln>
-              <a:headEnd/>
-              <a:tailEnd/>
-            </a:ln>
-          </p:spPr>
-          <p:style>
-            <a:lnRef idx="2">
-              <a:schemeClr val="accent2"/>
-            </a:lnRef>
-            <a:fillRef idx="1">
-              <a:schemeClr val="lt1"/>
-            </a:fillRef>
-            <a:effectRef idx="0">
-              <a:schemeClr val="accent2"/>
-            </a:effectRef>
-            <a:fontRef idx="minor">
-              <a:schemeClr val="dk1"/>
-            </a:fontRef>
-          </p:style>
-          <p:txBody>
-            <a:bodyPr lIns="90000" tIns="72000" rIns="90000" bIns="72000" rtlCol="0" anchor="ctr"/>
-            <a:lstStyle/>
-            <a:p>
-              <a:pPr marL="0" marR="0" lvl="0" indent="0" algn="ctr" defTabSz="914400" rtl="0" eaLnBrk="1" fontAlgn="base" latinLnBrk="0" hangingPunct="1">
-                <a:lnSpc>
-                  <a:spcPct val="100000"/>
-                </a:lnSpc>
-                <a:spcBef>
-                  <a:spcPct val="50000"/>
-                </a:spcBef>
-                <a:spcAft>
-                  <a:spcPct val="0"/>
-                </a:spcAft>
-                <a:buClr>
-                  <a:srgbClr val="F0AB00"/>
-                </a:buClr>
-                <a:buSzPct val="80000"/>
-                <a:buFontTx/>
-                <a:buNone/>
-                <a:tabLst/>
-                <a:defRPr/>
-              </a:pPr>
-              <a:r>
-                <a:rPr kumimoji="0" lang="de-DE" sz="1800" b="0" i="0" u="none" strike="noStrike" kern="0" cap="none" spc="0" normalizeH="0" baseline="0" noProof="0" dirty="0" err="1">
-                  <a:ln>
-                    <a:noFill/>
-                  </a:ln>
-                  <a:solidFill>
-                    <a:srgbClr val="000000"/>
-                  </a:solidFill>
-                  <a:effectLst/>
-                  <a:uLnTx/>
-                  <a:uFillTx/>
-                  <a:latin typeface="Arial"/>
-                  <a:ea typeface="Arial Unicode MS" pitchFamily="34" charset="-128"/>
-                  <a:cs typeface="Arial Unicode MS" pitchFamily="34" charset="-128"/>
-                </a:rPr>
-                <a:t>config</a:t>
-              </a:r>
-              <a:endParaRPr kumimoji="0" lang="de-DE" sz="1800" b="0" i="0" u="none" strike="noStrike" kern="0" cap="none" spc="0" normalizeH="0" baseline="0" noProof="0" dirty="0">
-                <a:ln>
-                  <a:noFill/>
-                </a:ln>
-                <a:solidFill>
-                  <a:srgbClr val="000000"/>
-                </a:solidFill>
-                <a:effectLst/>
-                <a:uLnTx/>
-                <a:uFillTx/>
-                <a:latin typeface="Arial"/>
-                <a:ea typeface="Arial Unicode MS" pitchFamily="34" charset="-128"/>
-                <a:cs typeface="Arial Unicode MS" pitchFamily="34" charset="-128"/>
-              </a:endParaRPr>
-            </a:p>
-          </p:txBody>
-        </p:sp>
-        <p:sp>
-          <p:nvSpPr>
-            <p:cNvPr id="10" name="Cylinder 9"/>
-            <p:cNvSpPr/>
-            <p:nvPr/>
-          </p:nvSpPr>
-          <p:spPr bwMode="gray">
-            <a:xfrm>
-              <a:off x="6481870" y="5248563"/>
-              <a:ext cx="998220" cy="1004248"/>
-            </a:xfrm>
-            <a:prstGeom prst="can">
-              <a:avLst/>
-            </a:prstGeom>
-            <a:ln>
-              <a:headEnd/>
-              <a:tailEnd/>
-            </a:ln>
-          </p:spPr>
-          <p:style>
-            <a:lnRef idx="2">
-              <a:schemeClr val="accent2"/>
-            </a:lnRef>
-            <a:fillRef idx="1">
-              <a:schemeClr val="lt1"/>
-            </a:fillRef>
-            <a:effectRef idx="0">
-              <a:schemeClr val="accent2"/>
-            </a:effectRef>
-            <a:fontRef idx="minor">
-              <a:schemeClr val="dk1"/>
-            </a:fontRef>
-          </p:style>
-          <p:txBody>
-            <a:bodyPr lIns="90000" tIns="72000" rIns="90000" bIns="72000" rtlCol="0" anchor="ctr"/>
-            <a:lstStyle/>
-            <a:p>
-              <a:pPr marL="0" marR="0" lvl="0" indent="0" algn="ctr" defTabSz="914400" rtl="0" eaLnBrk="1" fontAlgn="base" latinLnBrk="0" hangingPunct="1">
-                <a:lnSpc>
-                  <a:spcPct val="100000"/>
-                </a:lnSpc>
-                <a:spcBef>
-                  <a:spcPct val="50000"/>
-                </a:spcBef>
-                <a:spcAft>
-                  <a:spcPct val="0"/>
-                </a:spcAft>
-                <a:buClr>
-                  <a:srgbClr val="F0AB00"/>
-                </a:buClr>
-                <a:buSzPct val="80000"/>
-                <a:buFontTx/>
-                <a:buNone/>
-                <a:tabLst/>
-                <a:defRPr/>
-              </a:pPr>
-              <a:r>
-                <a:rPr kumimoji="0" lang="de-DE" sz="1800" b="0" i="0" u="none" strike="noStrike" kern="0" cap="none" spc="0" normalizeH="0" baseline="0" noProof="0" dirty="0" err="1">
-                  <a:ln>
-                    <a:noFill/>
-                  </a:ln>
-                  <a:solidFill>
-                    <a:srgbClr val="000000"/>
-                  </a:solidFill>
-                  <a:effectLst/>
-                  <a:uLnTx/>
-                  <a:uFillTx/>
-                  <a:latin typeface="Arial"/>
-                  <a:ea typeface="Arial Unicode MS" pitchFamily="34" charset="-128"/>
-                  <a:cs typeface="Arial Unicode MS" pitchFamily="34" charset="-128"/>
-                </a:rPr>
-                <a:t>tls</a:t>
-              </a:r>
-              <a:r>
-                <a:rPr kumimoji="0" lang="de-DE" sz="1800" b="0" i="0" u="none" strike="noStrike" kern="0" cap="none" spc="0" normalizeH="0" baseline="0" noProof="0" dirty="0">
-                  <a:ln>
-                    <a:noFill/>
-                  </a:ln>
-                  <a:solidFill>
-                    <a:srgbClr val="000000"/>
-                  </a:solidFill>
-                  <a:effectLst/>
-                  <a:uLnTx/>
-                  <a:uFillTx/>
-                  <a:latin typeface="Arial"/>
-                  <a:ea typeface="Arial Unicode MS" pitchFamily="34" charset="-128"/>
-                  <a:cs typeface="Arial Unicode MS" pitchFamily="34" charset="-128"/>
-                </a:rPr>
-                <a:t> </a:t>
-              </a:r>
-              <a:r>
-                <a:rPr kumimoji="0" lang="de-DE" sz="1800" b="0" i="0" u="none" strike="noStrike" kern="0" cap="none" spc="0" normalizeH="0" baseline="0" noProof="0" dirty="0" err="1">
-                  <a:ln>
-                    <a:noFill/>
-                  </a:ln>
-                  <a:solidFill>
-                    <a:srgbClr val="000000"/>
-                  </a:solidFill>
-                  <a:effectLst/>
-                  <a:uLnTx/>
-                  <a:uFillTx/>
-                  <a:latin typeface="Arial"/>
-                  <a:ea typeface="Arial Unicode MS" pitchFamily="34" charset="-128"/>
-                  <a:cs typeface="Arial Unicode MS" pitchFamily="34" charset="-128"/>
-                </a:rPr>
-                <a:t>certs</a:t>
-              </a:r>
-              <a:endParaRPr kumimoji="0" lang="de-DE" sz="1800" b="0" i="0" u="none" strike="noStrike" kern="0" cap="none" spc="0" normalizeH="0" baseline="0" noProof="0" dirty="0">
-                <a:ln>
-                  <a:noFill/>
-                </a:ln>
-                <a:solidFill>
-                  <a:srgbClr val="000000"/>
-                </a:solidFill>
-                <a:effectLst/>
-                <a:uLnTx/>
-                <a:uFillTx/>
-                <a:latin typeface="Arial"/>
-                <a:ea typeface="Arial Unicode MS" pitchFamily="34" charset="-128"/>
-                <a:cs typeface="Arial Unicode MS" pitchFamily="34" charset="-128"/>
-              </a:endParaRPr>
-            </a:p>
-          </p:txBody>
-        </p:sp>
-      </p:grpSp>
-      <p:sp>
-        <p:nvSpPr>
-          <p:cNvPr id="16" name="Arrow: Up-Down 15"/>
-          <p:cNvSpPr/>
-          <p:nvPr/>
-        </p:nvSpPr>
-        <p:spPr bwMode="gray">
-          <a:xfrm>
-            <a:off x="5657231" y="4400550"/>
-            <a:ext cx="222219" cy="845820"/>
-          </a:xfrm>
-          <a:prstGeom prst="upDownArrow">
-            <a:avLst/>
-          </a:prstGeom>
-          <a:solidFill>
-            <a:schemeClr val="accent1"/>
-          </a:solidFill>
-          <a:ln w="6350" algn="ctr">
-            <a:noFill/>
-            <a:miter lim="800000"/>
-            <a:headEnd/>
-            <a:tailEnd/>
-          </a:ln>
-        </p:spPr>
-        <p:txBody>
-          <a:bodyPr lIns="90000" tIns="72000" rIns="90000" bIns="72000" rtlCol="0" anchor="ctr"/>
-          <a:lstStyle/>
-          <a:p>
-            <a:pPr marL="0" marR="0" lvl="0" indent="0" algn="ctr" defTabSz="914400" rtl="0" eaLnBrk="1" fontAlgn="base" latinLnBrk="0" hangingPunct="1">
-              <a:lnSpc>
-                <a:spcPct val="100000"/>
-              </a:lnSpc>
-              <a:spcBef>
-                <a:spcPct val="50000"/>
-              </a:spcBef>
-              <a:spcAft>
-                <a:spcPct val="0"/>
-              </a:spcAft>
-              <a:buClr>
-                <a:srgbClr val="F0AB00"/>
-              </a:buClr>
-              <a:buSzPct val="80000"/>
-              <a:buFontTx/>
-              <a:buNone/>
-              <a:tabLst/>
-              <a:defRPr/>
-            </a:pPr>
-            <a:endParaRPr kumimoji="0" lang="en-US" sz="1800" b="0" i="0" u="none" strike="noStrike" kern="0" cap="none" spc="0" normalizeH="0" baseline="0" noProof="0" dirty="0" err="1">
-              <a:ln>
-                <a:noFill/>
-              </a:ln>
-              <a:solidFill>
-                <a:srgbClr val="FFFFFF"/>
-              </a:solidFill>
-              <a:effectLst/>
-              <a:uLnTx/>
-              <a:uFillTx/>
-              <a:latin typeface="Arial"/>
-              <a:ea typeface="Arial Unicode MS" pitchFamily="34" charset="-128"/>
-              <a:cs typeface="Arial Unicode MS" pitchFamily="34" charset="-128"/>
-            </a:endParaRPr>
-          </a:p>
-        </p:txBody>
-      </p:sp>
-      <p:sp>
-        <p:nvSpPr>
-          <p:cNvPr id="17" name="Cloud 16"/>
-          <p:cNvSpPr/>
-          <p:nvPr/>
-        </p:nvSpPr>
-        <p:spPr bwMode="gray">
-          <a:xfrm>
-            <a:off x="4077319" y="1126276"/>
-            <a:ext cx="3382042" cy="914400"/>
-          </a:xfrm>
-          <a:prstGeom prst="cloud">
-            <a:avLst/>
-          </a:prstGeom>
-          <a:solidFill>
-            <a:schemeClr val="accent1"/>
-          </a:solidFill>
-          <a:ln w="6350" algn="ctr">
-            <a:noFill/>
-            <a:miter lim="800000"/>
-            <a:headEnd/>
-            <a:tailEnd/>
-          </a:ln>
-        </p:spPr>
-        <p:txBody>
-          <a:bodyPr lIns="90000" tIns="72000" rIns="90000" bIns="72000" rtlCol="0" anchor="ctr"/>
-          <a:lstStyle/>
-          <a:p>
-            <a:pPr marL="0" marR="0" lvl="0" indent="0" algn="ctr" defTabSz="914400" rtl="0" eaLnBrk="1" fontAlgn="base" latinLnBrk="0" hangingPunct="1">
-              <a:lnSpc>
-                <a:spcPct val="100000"/>
-              </a:lnSpc>
-              <a:spcBef>
-                <a:spcPct val="50000"/>
-              </a:spcBef>
-              <a:spcAft>
-                <a:spcPct val="0"/>
-              </a:spcAft>
-              <a:buClr>
-                <a:srgbClr val="F0AB00"/>
-              </a:buClr>
-              <a:buSzPct val="80000"/>
-              <a:buFontTx/>
-              <a:buNone/>
-              <a:tabLst/>
-              <a:defRPr/>
-            </a:pPr>
-            <a:endParaRPr kumimoji="0" lang="en-US" sz="1800" b="0" i="0" u="none" strike="noStrike" kern="0" cap="none" spc="0" normalizeH="0" baseline="0" noProof="0" dirty="0" err="1">
-              <a:ln>
-                <a:noFill/>
-              </a:ln>
-              <a:solidFill>
-                <a:srgbClr val="FFFFFF"/>
-              </a:solidFill>
-              <a:effectLst/>
-              <a:uLnTx/>
-              <a:uFillTx/>
-              <a:latin typeface="Arial"/>
-              <a:ea typeface="Arial Unicode MS" pitchFamily="34" charset="-128"/>
-              <a:cs typeface="Arial Unicode MS" pitchFamily="34" charset="-128"/>
-            </a:endParaRPr>
-          </a:p>
-        </p:txBody>
-      </p:sp>
-      <p:sp>
-        <p:nvSpPr>
-          <p:cNvPr id="18" name="Arrow: Up-Down 17"/>
-          <p:cNvSpPr/>
-          <p:nvPr/>
-        </p:nvSpPr>
-        <p:spPr bwMode="gray">
-          <a:xfrm>
-            <a:off x="5657231" y="2071898"/>
-            <a:ext cx="222219" cy="845820"/>
-          </a:xfrm>
-          <a:prstGeom prst="upDownArrow">
-            <a:avLst/>
-          </a:prstGeom>
-          <a:solidFill>
-            <a:schemeClr val="accent1"/>
-          </a:solidFill>
-          <a:ln w="6350" algn="ctr">
-            <a:noFill/>
-            <a:miter lim="800000"/>
-            <a:headEnd/>
-            <a:tailEnd/>
-          </a:ln>
-        </p:spPr>
-        <p:txBody>
-          <a:bodyPr lIns="90000" tIns="72000" rIns="90000" bIns="72000" rtlCol="0" anchor="ctr"/>
-          <a:lstStyle/>
-          <a:p>
-            <a:pPr marL="0" marR="0" lvl="0" indent="0" algn="ctr" defTabSz="914400" rtl="0" eaLnBrk="1" fontAlgn="base" latinLnBrk="0" hangingPunct="1">
-              <a:lnSpc>
-                <a:spcPct val="100000"/>
-              </a:lnSpc>
-              <a:spcBef>
-                <a:spcPct val="50000"/>
-              </a:spcBef>
-              <a:spcAft>
-                <a:spcPct val="0"/>
-              </a:spcAft>
-              <a:buClr>
-                <a:srgbClr val="F0AB00"/>
-              </a:buClr>
-              <a:buSzPct val="80000"/>
-              <a:buFontTx/>
-              <a:buNone/>
-              <a:tabLst/>
-              <a:defRPr/>
-            </a:pPr>
-            <a:endParaRPr kumimoji="0" lang="en-US" sz="1800" b="0" i="0" u="none" strike="noStrike" kern="0" cap="none" spc="0" normalizeH="0" baseline="0" noProof="0" dirty="0" err="1">
-              <a:ln>
-                <a:noFill/>
-              </a:ln>
-              <a:solidFill>
-                <a:srgbClr val="FFFFFF"/>
-              </a:solidFill>
-              <a:effectLst/>
-              <a:uLnTx/>
-              <a:uFillTx/>
-              <a:latin typeface="Arial"/>
-              <a:ea typeface="Arial Unicode MS" pitchFamily="34" charset="-128"/>
-              <a:cs typeface="Arial Unicode MS" pitchFamily="34" charset="-128"/>
-            </a:endParaRPr>
-          </a:p>
-        </p:txBody>
-      </p:sp>
-    </p:spTree>
-    <p:extLst>
-      <p:ext uri="{BB962C8B-B14F-4D97-AF65-F5344CB8AC3E}">
-        <p14:creationId xmlns:p14="http://schemas.microsoft.com/office/powerpoint/2010/main" val="1164703336"/>
-      </p:ext>
-    </p:extLst>
-  </p:cSld>
-  <p:clrMapOvr>
-    <a:masterClrMapping/>
-  </p:clrMapOvr>
-</p:sld>
-</file>
-
-<file path=ppt/slides/slide9.xml><?xml version="1.0" encoding="utf-8"?>
-<p:sld xmlns:a="http://schemas.openxmlformats.org/drawingml/2006/main" xmlns:r="http://schemas.openxmlformats.org/officeDocument/2006/relationships" xmlns:p="http://schemas.openxmlformats.org/presentationml/2006/main">
-  <p:cSld>
-    <p:spTree>
-      <p:nvGrpSpPr>
-        <p:cNvPr id="1" name=""/>
-        <p:cNvGrpSpPr/>
-        <p:nvPr/>
-      </p:nvGrpSpPr>
-      <p:grpSpPr>
-        <a:xfrm>
-          <a:off x="0" y="0"/>
-          <a:ext cx="0" cy="0"/>
-          <a:chOff x="0" y="0"/>
-          <a:chExt cx="0" cy="0"/>
-        </a:xfrm>
-      </p:grpSpPr>
-      <p:sp>
-        <p:nvSpPr>
-          <p:cNvPr id="3" name="Title 2"/>
-          <p:cNvSpPr>
-            <a:spLocks noGrp="1"/>
-          </p:cNvSpPr>
-          <p:nvPr>
-            <p:ph type="title"/>
-          </p:nvPr>
-        </p:nvSpPr>
-        <p:spPr/>
-        <p:txBody>
-          <a:bodyPr/>
-          <a:lstStyle/>
-          <a:p>
-            <a:r>
-              <a:rPr lang="en-US" dirty="0"/>
-              <a:t>Demo</a:t>
-            </a:r>
-          </a:p>
-        </p:txBody>
-      </p:sp>
-      <p:pic>
-        <p:nvPicPr>
-          <p:cNvPr id="4" name="Picture 3">
-            <a:extLst>
-              <a:ext uri="{FF2B5EF4-FFF2-40B4-BE49-F238E27FC236}">
-                <a16:creationId xmlns:a16="http://schemas.microsoft.com/office/drawing/2014/main" id="{667C7630-D1BA-44ED-BD0C-E0F24DE56B91}"/>
-              </a:ext>
-            </a:extLst>
-          </p:cNvPr>
-          <p:cNvPicPr>
-            <a:picLocks noChangeAspect="1"/>
-          </p:cNvPicPr>
-          <p:nvPr/>
-        </p:nvPicPr>
-        <p:blipFill>
-          <a:blip r:embed="rId3"/>
-          <a:stretch>
-            <a:fillRect/>
-          </a:stretch>
-        </p:blipFill>
-        <p:spPr>
-          <a:xfrm>
-            <a:off x="3849419" y="1181180"/>
-            <a:ext cx="4495640" cy="4495640"/>
-          </a:xfrm>
-          <a:prstGeom prst="rect">
-            <a:avLst/>
-          </a:prstGeom>
-        </p:spPr>
-      </p:pic>
-    </p:spTree>
-    <p:extLst>
-      <p:ext uri="{BB962C8B-B14F-4D97-AF65-F5344CB8AC3E}">
-        <p14:creationId xmlns:p14="http://schemas.microsoft.com/office/powerpoint/2010/main" val="3545399272"/>
-      </p:ext>
-    </p:extLst>
-  </p:cSld>
-  <p:clrMapOvr>
-    <a:masterClrMapping/>
-  </p:clrMapOvr>
+  <p:transition spd="med"/>
 </p:sld>
 </file>
 

</xml_diff>

<commit_message>
fixed missed shape for pod
</commit_message>
<xml_diff>
--- a/kubernetes/k8s-bulletinboard/03_k8s-bulletinboard.pptx
+++ b/kubernetes/k8s-bulletinboard/03_k8s-bulletinboard.pptx
@@ -9417,7 +9417,7 @@
             <a:noFill/>
             <a:extLst>
               <a:ext uri="{909E8E84-426E-40dd-AFC4-6F175D3DCCD1}">
-                <a14:hiddenFill xmlns:a14="http://schemas.microsoft.com/office/drawing/2010/main" xmlns="">
+                <a14:hiddenFill xmlns="" xmlns:a14="http://schemas.microsoft.com/office/drawing/2010/main">
                   <a:solidFill>
                     <a:srgbClr val="FFFFFF"/>
                   </a:solidFill>
@@ -9674,7 +9674,7 @@
             <a:noFill/>
             <a:extLst>
               <a:ext uri="{909E8E84-426E-40dd-AFC4-6F175D3DCCD1}">
-                <a14:hiddenFill xmlns="" xmlns:a14="http://schemas.microsoft.com/office/drawing/2010/main">
+                <a14:hiddenFill xmlns:a14="http://schemas.microsoft.com/office/drawing/2010/main" xmlns="">
                   <a:solidFill>
                     <a:srgbClr val="FFFFFF"/>
                   </a:solidFill>
@@ -18142,7 +18142,7 @@
             <a:noFill/>
             <a:extLst>
               <a:ext uri="{909E8E84-426E-40dd-AFC4-6F175D3DCCD1}">
-                <a14:hiddenFill xmlns:a14="http://schemas.microsoft.com/office/drawing/2010/main" xmlns="">
+                <a14:hiddenFill xmlns="" xmlns:a14="http://schemas.microsoft.com/office/drawing/2010/main">
                   <a:solidFill>
                     <a:srgbClr val="FFFFFF"/>
                   </a:solidFill>
@@ -18399,7 +18399,7 @@
             <a:noFill/>
             <a:extLst>
               <a:ext uri="{909E8E84-426E-40dd-AFC4-6F175D3DCCD1}">
-                <a14:hiddenFill xmlns="" xmlns:a14="http://schemas.microsoft.com/office/drawing/2010/main">
+                <a14:hiddenFill xmlns:a14="http://schemas.microsoft.com/office/drawing/2010/main" xmlns="">
                   <a:solidFill>
                     <a:srgbClr val="FFFFFF"/>
                   </a:solidFill>
@@ -22099,7 +22099,7 @@
             <a:noFill/>
             <a:extLst>
               <a:ext uri="{909E8E84-426E-40dd-AFC4-6F175D3DCCD1}">
-                <a14:hiddenFill xmlns="" xmlns:a14="http://schemas.microsoft.com/office/drawing/2010/main">
+                <a14:hiddenFill xmlns:a14="http://schemas.microsoft.com/office/drawing/2010/main" xmlns="">
                   <a:solidFill>
                     <a:srgbClr val="FFFFFF"/>
                   </a:solidFill>
@@ -22346,7 +22346,7 @@
             <a:noFill/>
             <a:extLst>
               <a:ext uri="{909E8E84-426E-40dd-AFC4-6F175D3DCCD1}">
-                <a14:hiddenFill xmlns:a14="http://schemas.microsoft.com/office/drawing/2010/main" xmlns="">
+                <a14:hiddenFill xmlns="" xmlns:a14="http://schemas.microsoft.com/office/drawing/2010/main">
                   <a:solidFill>
                     <a:srgbClr val="FFFFFF"/>
                   </a:solidFill>
@@ -38364,10 +38364,7 @@
             <a:avLst/>
           </a:prstGeom>
           <a:solidFill>
-            <a:schemeClr val="bg1">
-              <a:lumMod val="65000"/>
-              <a:lumOff val="35000"/>
-            </a:schemeClr>
+            <a:srgbClr val="CCCCCC"/>
           </a:solidFill>
           <a:ln>
             <a:solidFill>
@@ -38500,7 +38497,7 @@
             <a:avLst/>
           </a:prstGeom>
           <a:solidFill>
-            <a:schemeClr val="tx2"/>
+            <a:srgbClr val="FFFFFF"/>
           </a:solidFill>
           <a:ln>
             <a:solidFill>

</xml_diff>